<commit_message>
Edited UG/DG for Security, added ClassDiagram and Architecture.
</commit_message>
<xml_diff>
--- a/docs/diagrams/ArchitectureDiagram.pptx
+++ b/docs/diagrams/ArchitectureDiagram.pptx
@@ -107,6 +107,22 @@
       </a:defRPr>
     </a:lvl9pPr>
   </p:defaultTextStyle>
+  <p:extLst>
+    <p:ext uri="{EFAFB233-063F-42B5-8137-9DF3F51BA10A}">
+      <p15:sldGuideLst xmlns:p15="http://schemas.microsoft.com/office/powerpoint/2012/main">
+        <p15:guide id="1" orient="horz" pos="1488">
+          <p15:clr>
+            <a:srgbClr val="A4A3A4"/>
+          </p15:clr>
+        </p15:guide>
+        <p15:guide id="2" pos="2880">
+          <p15:clr>
+            <a:srgbClr val="A4A3A4"/>
+          </p15:clr>
+        </p15:guide>
+      </p15:sldGuideLst>
+    </p:ext>
+  </p:extLst>
 </p:presentation>
 </file>
 
@@ -192,7 +208,7 @@
           <a:p>
             <a:fld id="{F5CC4B3F-88C1-4FFA-B1B6-F41C21DC6924}" type="datetimeFigureOut">
               <a:rPr lang="en-US" smtClean="0"/>
-              <a:t>10/16/2016</a:t>
+              <a:t>10/11/2018</a:t>
             </a:fld>
             <a:endParaRPr lang="en-US"/>
           </a:p>
@@ -256,38 +272,37 @@
           <a:p>
             <a:pPr lvl="0"/>
             <a:r>
-              <a:rPr lang="en-US" smtClean="0"/>
+              <a:rPr lang="en-US"/>
               <a:t>Click to edit Master text styles</a:t>
             </a:r>
           </a:p>
           <a:p>
             <a:pPr lvl="1"/>
             <a:r>
-              <a:rPr lang="en-US" smtClean="0"/>
+              <a:rPr lang="en-US"/>
               <a:t>Second level</a:t>
             </a:r>
           </a:p>
           <a:p>
             <a:pPr lvl="2"/>
             <a:r>
-              <a:rPr lang="en-US" smtClean="0"/>
+              <a:rPr lang="en-US"/>
               <a:t>Third level</a:t>
             </a:r>
           </a:p>
           <a:p>
             <a:pPr lvl="3"/>
             <a:r>
-              <a:rPr lang="en-US" smtClean="0"/>
+              <a:rPr lang="en-US"/>
               <a:t>Fourth level</a:t>
             </a:r>
           </a:p>
           <a:p>
             <a:pPr lvl="4"/>
             <a:r>
-              <a:rPr lang="en-US" smtClean="0"/>
+              <a:rPr lang="en-US"/>
               <a:t>Fifth level</a:t>
             </a:r>
-            <a:endParaRPr lang="en-US"/>
           </a:p>
         </p:txBody>
       </p:sp>
@@ -498,10 +513,9 @@
           <a:lstStyle/>
           <a:p>
             <a:r>
-              <a:rPr lang="en-US" smtClean="0"/>
+              <a:rPr lang="en-US"/>
               <a:t>Click to edit Master title style</a:t>
             </a:r>
-            <a:endParaRPr lang="en-US"/>
           </a:p>
         </p:txBody>
       </p:sp>
@@ -617,10 +631,9 @@
           </a:lstStyle>
           <a:p>
             <a:r>
-              <a:rPr lang="en-US" smtClean="0"/>
+              <a:rPr lang="en-US"/>
               <a:t>Click to edit Master subtitle style</a:t>
             </a:r>
-            <a:endParaRPr lang="en-US"/>
           </a:p>
         </p:txBody>
       </p:sp>
@@ -641,7 +654,7 @@
           <a:p>
             <a:fld id="{78C97017-6FC3-485B-9764-EAC9E56C1D49}" type="datetimeFigureOut">
               <a:rPr lang="en-US" smtClean="0"/>
-              <a:t>10/16/2016</a:t>
+              <a:t>10/11/2018</a:t>
             </a:fld>
             <a:endParaRPr lang="en-US"/>
           </a:p>
@@ -735,10 +748,9 @@
           <a:lstStyle/>
           <a:p>
             <a:r>
-              <a:rPr lang="en-US" smtClean="0"/>
+              <a:rPr lang="en-US"/>
               <a:t>Click to edit Master title style</a:t>
             </a:r>
-            <a:endParaRPr lang="en-US"/>
           </a:p>
         </p:txBody>
       </p:sp>
@@ -759,38 +771,37 @@
           <a:p>
             <a:pPr lvl="0"/>
             <a:r>
-              <a:rPr lang="en-US" smtClean="0"/>
+              <a:rPr lang="en-US"/>
               <a:t>Click to edit Master text styles</a:t>
             </a:r>
           </a:p>
           <a:p>
             <a:pPr lvl="1"/>
             <a:r>
-              <a:rPr lang="en-US" smtClean="0"/>
+              <a:rPr lang="en-US"/>
               <a:t>Second level</a:t>
             </a:r>
           </a:p>
           <a:p>
             <a:pPr lvl="2"/>
             <a:r>
-              <a:rPr lang="en-US" smtClean="0"/>
+              <a:rPr lang="en-US"/>
               <a:t>Third level</a:t>
             </a:r>
           </a:p>
           <a:p>
             <a:pPr lvl="3"/>
             <a:r>
-              <a:rPr lang="en-US" smtClean="0"/>
+              <a:rPr lang="en-US"/>
               <a:t>Fourth level</a:t>
             </a:r>
           </a:p>
           <a:p>
             <a:pPr lvl="4"/>
             <a:r>
-              <a:rPr lang="en-US" smtClean="0"/>
+              <a:rPr lang="en-US"/>
               <a:t>Fifth level</a:t>
             </a:r>
-            <a:endParaRPr lang="en-US"/>
           </a:p>
         </p:txBody>
       </p:sp>
@@ -811,7 +822,7 @@
           <a:p>
             <a:fld id="{78C97017-6FC3-485B-9764-EAC9E56C1D49}" type="datetimeFigureOut">
               <a:rPr lang="en-US" smtClean="0"/>
-              <a:t>10/16/2016</a:t>
+              <a:t>10/11/2018</a:t>
             </a:fld>
             <a:endParaRPr lang="en-US"/>
           </a:p>
@@ -910,10 +921,9 @@
           <a:lstStyle/>
           <a:p>
             <a:r>
-              <a:rPr lang="en-US" smtClean="0"/>
+              <a:rPr lang="en-US"/>
               <a:t>Click to edit Master title style</a:t>
             </a:r>
-            <a:endParaRPr lang="en-US"/>
           </a:p>
         </p:txBody>
       </p:sp>
@@ -939,38 +949,37 @@
           <a:p>
             <a:pPr lvl="0"/>
             <a:r>
-              <a:rPr lang="en-US" smtClean="0"/>
+              <a:rPr lang="en-US"/>
               <a:t>Click to edit Master text styles</a:t>
             </a:r>
           </a:p>
           <a:p>
             <a:pPr lvl="1"/>
             <a:r>
-              <a:rPr lang="en-US" smtClean="0"/>
+              <a:rPr lang="en-US"/>
               <a:t>Second level</a:t>
             </a:r>
           </a:p>
           <a:p>
             <a:pPr lvl="2"/>
             <a:r>
-              <a:rPr lang="en-US" smtClean="0"/>
+              <a:rPr lang="en-US"/>
               <a:t>Third level</a:t>
             </a:r>
           </a:p>
           <a:p>
             <a:pPr lvl="3"/>
             <a:r>
-              <a:rPr lang="en-US" smtClean="0"/>
+              <a:rPr lang="en-US"/>
               <a:t>Fourth level</a:t>
             </a:r>
           </a:p>
           <a:p>
             <a:pPr lvl="4"/>
             <a:r>
-              <a:rPr lang="en-US" smtClean="0"/>
+              <a:rPr lang="en-US"/>
               <a:t>Fifth level</a:t>
             </a:r>
-            <a:endParaRPr lang="en-US"/>
           </a:p>
         </p:txBody>
       </p:sp>
@@ -991,7 +1000,7 @@
           <a:p>
             <a:fld id="{78C97017-6FC3-485B-9764-EAC9E56C1D49}" type="datetimeFigureOut">
               <a:rPr lang="en-US" smtClean="0"/>
-              <a:t>10/16/2016</a:t>
+              <a:t>10/11/2018</a:t>
             </a:fld>
             <a:endParaRPr lang="en-US"/>
           </a:p>
@@ -1085,10 +1094,9 @@
           <a:lstStyle/>
           <a:p>
             <a:r>
-              <a:rPr lang="en-US" smtClean="0"/>
+              <a:rPr lang="en-US"/>
               <a:t>Click to edit Master title style</a:t>
             </a:r>
-            <a:endParaRPr lang="en-US"/>
           </a:p>
         </p:txBody>
       </p:sp>
@@ -1109,38 +1117,37 @@
           <a:p>
             <a:pPr lvl="0"/>
             <a:r>
-              <a:rPr lang="en-US" smtClean="0"/>
+              <a:rPr lang="en-US"/>
               <a:t>Click to edit Master text styles</a:t>
             </a:r>
           </a:p>
           <a:p>
             <a:pPr lvl="1"/>
             <a:r>
-              <a:rPr lang="en-US" smtClean="0"/>
+              <a:rPr lang="en-US"/>
               <a:t>Second level</a:t>
             </a:r>
           </a:p>
           <a:p>
             <a:pPr lvl="2"/>
             <a:r>
-              <a:rPr lang="en-US" smtClean="0"/>
+              <a:rPr lang="en-US"/>
               <a:t>Third level</a:t>
             </a:r>
           </a:p>
           <a:p>
             <a:pPr lvl="3"/>
             <a:r>
-              <a:rPr lang="en-US" smtClean="0"/>
+              <a:rPr lang="en-US"/>
               <a:t>Fourth level</a:t>
             </a:r>
           </a:p>
           <a:p>
             <a:pPr lvl="4"/>
             <a:r>
-              <a:rPr lang="en-US" smtClean="0"/>
+              <a:rPr lang="en-US"/>
               <a:t>Fifth level</a:t>
             </a:r>
-            <a:endParaRPr lang="en-US"/>
           </a:p>
         </p:txBody>
       </p:sp>
@@ -1161,7 +1168,7 @@
           <a:p>
             <a:fld id="{78C97017-6FC3-485B-9764-EAC9E56C1D49}" type="datetimeFigureOut">
               <a:rPr lang="en-US" smtClean="0"/>
-              <a:t>10/16/2016</a:t>
+              <a:t>10/11/2018</a:t>
             </a:fld>
             <a:endParaRPr lang="en-US"/>
           </a:p>
@@ -1264,10 +1271,9 @@
           </a:lstStyle>
           <a:p>
             <a:r>
-              <a:rPr lang="en-US" smtClean="0"/>
+              <a:rPr lang="en-US"/>
               <a:t>Click to edit Master title style</a:t>
             </a:r>
-            <a:endParaRPr lang="en-US"/>
           </a:p>
         </p:txBody>
       </p:sp>
@@ -1384,7 +1390,7 @@
           <a:p>
             <a:pPr lvl="0"/>
             <a:r>
-              <a:rPr lang="en-US" smtClean="0"/>
+              <a:rPr lang="en-US"/>
               <a:t>Click to edit Master text styles</a:t>
             </a:r>
           </a:p>
@@ -1407,7 +1413,7 @@
           <a:p>
             <a:fld id="{78C97017-6FC3-485B-9764-EAC9E56C1D49}" type="datetimeFigureOut">
               <a:rPr lang="en-US" smtClean="0"/>
-              <a:t>10/16/2016</a:t>
+              <a:t>10/11/2018</a:t>
             </a:fld>
             <a:endParaRPr lang="en-US"/>
           </a:p>
@@ -1501,10 +1507,9 @@
           <a:lstStyle/>
           <a:p>
             <a:r>
-              <a:rPr lang="en-US" smtClean="0"/>
+              <a:rPr lang="en-US"/>
               <a:t>Click to edit Master title style</a:t>
             </a:r>
-            <a:endParaRPr lang="en-US"/>
           </a:p>
         </p:txBody>
       </p:sp>
@@ -1558,38 +1563,37 @@
           <a:p>
             <a:pPr lvl="0"/>
             <a:r>
-              <a:rPr lang="en-US" smtClean="0"/>
+              <a:rPr lang="en-US"/>
               <a:t>Click to edit Master text styles</a:t>
             </a:r>
           </a:p>
           <a:p>
             <a:pPr lvl="1"/>
             <a:r>
-              <a:rPr lang="en-US" smtClean="0"/>
+              <a:rPr lang="en-US"/>
               <a:t>Second level</a:t>
             </a:r>
           </a:p>
           <a:p>
             <a:pPr lvl="2"/>
             <a:r>
-              <a:rPr lang="en-US" smtClean="0"/>
+              <a:rPr lang="en-US"/>
               <a:t>Third level</a:t>
             </a:r>
           </a:p>
           <a:p>
             <a:pPr lvl="3"/>
             <a:r>
-              <a:rPr lang="en-US" smtClean="0"/>
+              <a:rPr lang="en-US"/>
               <a:t>Fourth level</a:t>
             </a:r>
           </a:p>
           <a:p>
             <a:pPr lvl="4"/>
             <a:r>
-              <a:rPr lang="en-US" smtClean="0"/>
+              <a:rPr lang="en-US"/>
               <a:t>Fifth level</a:t>
             </a:r>
-            <a:endParaRPr lang="en-US"/>
           </a:p>
         </p:txBody>
       </p:sp>
@@ -1643,38 +1647,37 @@
           <a:p>
             <a:pPr lvl="0"/>
             <a:r>
-              <a:rPr lang="en-US" smtClean="0"/>
+              <a:rPr lang="en-US"/>
               <a:t>Click to edit Master text styles</a:t>
             </a:r>
           </a:p>
           <a:p>
             <a:pPr lvl="1"/>
             <a:r>
-              <a:rPr lang="en-US" smtClean="0"/>
+              <a:rPr lang="en-US"/>
               <a:t>Second level</a:t>
             </a:r>
           </a:p>
           <a:p>
             <a:pPr lvl="2"/>
             <a:r>
-              <a:rPr lang="en-US" smtClean="0"/>
+              <a:rPr lang="en-US"/>
               <a:t>Third level</a:t>
             </a:r>
           </a:p>
           <a:p>
             <a:pPr lvl="3"/>
             <a:r>
-              <a:rPr lang="en-US" smtClean="0"/>
+              <a:rPr lang="en-US"/>
               <a:t>Fourth level</a:t>
             </a:r>
           </a:p>
           <a:p>
             <a:pPr lvl="4"/>
             <a:r>
-              <a:rPr lang="en-US" smtClean="0"/>
+              <a:rPr lang="en-US"/>
               <a:t>Fifth level</a:t>
             </a:r>
-            <a:endParaRPr lang="en-US"/>
           </a:p>
         </p:txBody>
       </p:sp>
@@ -1695,7 +1698,7 @@
           <a:p>
             <a:fld id="{78C97017-6FC3-485B-9764-EAC9E56C1D49}" type="datetimeFigureOut">
               <a:rPr lang="en-US" smtClean="0"/>
-              <a:t>10/16/2016</a:t>
+              <a:t>10/11/2018</a:t>
             </a:fld>
             <a:endParaRPr lang="en-US"/>
           </a:p>
@@ -1793,10 +1796,9 @@
           </a:lstStyle>
           <a:p>
             <a:r>
-              <a:rPr lang="en-US" smtClean="0"/>
+              <a:rPr lang="en-US"/>
               <a:t>Click to edit Master title style</a:t>
             </a:r>
-            <a:endParaRPr lang="en-US"/>
           </a:p>
         </p:txBody>
       </p:sp>
@@ -1859,7 +1861,7 @@
           <a:p>
             <a:pPr lvl="0"/>
             <a:r>
-              <a:rPr lang="en-US" smtClean="0"/>
+              <a:rPr lang="en-US"/>
               <a:t>Click to edit Master text styles</a:t>
             </a:r>
           </a:p>
@@ -1915,38 +1917,37 @@
           <a:p>
             <a:pPr lvl="0"/>
             <a:r>
-              <a:rPr lang="en-US" smtClean="0"/>
+              <a:rPr lang="en-US"/>
               <a:t>Click to edit Master text styles</a:t>
             </a:r>
           </a:p>
           <a:p>
             <a:pPr lvl="1"/>
             <a:r>
-              <a:rPr lang="en-US" smtClean="0"/>
+              <a:rPr lang="en-US"/>
               <a:t>Second level</a:t>
             </a:r>
           </a:p>
           <a:p>
             <a:pPr lvl="2"/>
             <a:r>
-              <a:rPr lang="en-US" smtClean="0"/>
+              <a:rPr lang="en-US"/>
               <a:t>Third level</a:t>
             </a:r>
           </a:p>
           <a:p>
             <a:pPr lvl="3"/>
             <a:r>
-              <a:rPr lang="en-US" smtClean="0"/>
+              <a:rPr lang="en-US"/>
               <a:t>Fourth level</a:t>
             </a:r>
           </a:p>
           <a:p>
             <a:pPr lvl="4"/>
             <a:r>
-              <a:rPr lang="en-US" smtClean="0"/>
+              <a:rPr lang="en-US"/>
               <a:t>Fifth level</a:t>
             </a:r>
-            <a:endParaRPr lang="en-US"/>
           </a:p>
         </p:txBody>
       </p:sp>
@@ -2009,7 +2010,7 @@
           <a:p>
             <a:pPr lvl="0"/>
             <a:r>
-              <a:rPr lang="en-US" smtClean="0"/>
+              <a:rPr lang="en-US"/>
               <a:t>Click to edit Master text styles</a:t>
             </a:r>
           </a:p>
@@ -2065,38 +2066,37 @@
           <a:p>
             <a:pPr lvl="0"/>
             <a:r>
-              <a:rPr lang="en-US" smtClean="0"/>
+              <a:rPr lang="en-US"/>
               <a:t>Click to edit Master text styles</a:t>
             </a:r>
           </a:p>
           <a:p>
             <a:pPr lvl="1"/>
             <a:r>
-              <a:rPr lang="en-US" smtClean="0"/>
+              <a:rPr lang="en-US"/>
               <a:t>Second level</a:t>
             </a:r>
           </a:p>
           <a:p>
             <a:pPr lvl="2"/>
             <a:r>
-              <a:rPr lang="en-US" smtClean="0"/>
+              <a:rPr lang="en-US"/>
               <a:t>Third level</a:t>
             </a:r>
           </a:p>
           <a:p>
             <a:pPr lvl="3"/>
             <a:r>
-              <a:rPr lang="en-US" smtClean="0"/>
+              <a:rPr lang="en-US"/>
               <a:t>Fourth level</a:t>
             </a:r>
           </a:p>
           <a:p>
             <a:pPr lvl="4"/>
             <a:r>
-              <a:rPr lang="en-US" smtClean="0"/>
+              <a:rPr lang="en-US"/>
               <a:t>Fifth level</a:t>
             </a:r>
-            <a:endParaRPr lang="en-US"/>
           </a:p>
         </p:txBody>
       </p:sp>
@@ -2117,7 +2117,7 @@
           <a:p>
             <a:fld id="{78C97017-6FC3-485B-9764-EAC9E56C1D49}" type="datetimeFigureOut">
               <a:rPr lang="en-US" smtClean="0"/>
-              <a:t>10/16/2016</a:t>
+              <a:t>10/11/2018</a:t>
             </a:fld>
             <a:endParaRPr lang="en-US"/>
           </a:p>
@@ -2211,10 +2211,9 @@
           <a:lstStyle/>
           <a:p>
             <a:r>
-              <a:rPr lang="en-US" smtClean="0"/>
+              <a:rPr lang="en-US"/>
               <a:t>Click to edit Master title style</a:t>
             </a:r>
-            <a:endParaRPr lang="en-US"/>
           </a:p>
         </p:txBody>
       </p:sp>
@@ -2235,7 +2234,7 @@
           <a:p>
             <a:fld id="{78C97017-6FC3-485B-9764-EAC9E56C1D49}" type="datetimeFigureOut">
               <a:rPr lang="en-US" smtClean="0"/>
-              <a:t>10/16/2016</a:t>
+              <a:t>10/11/2018</a:t>
             </a:fld>
             <a:endParaRPr lang="en-US"/>
           </a:p>
@@ -2330,7 +2329,7 @@
           <a:p>
             <a:fld id="{78C97017-6FC3-485B-9764-EAC9E56C1D49}" type="datetimeFigureOut">
               <a:rPr lang="en-US" smtClean="0"/>
-              <a:t>10/16/2016</a:t>
+              <a:t>10/11/2018</a:t>
             </a:fld>
             <a:endParaRPr lang="en-US"/>
           </a:p>
@@ -2433,10 +2432,9 @@
           </a:lstStyle>
           <a:p>
             <a:r>
-              <a:rPr lang="en-US" smtClean="0"/>
+              <a:rPr lang="en-US"/>
               <a:t>Click to edit Master title style</a:t>
             </a:r>
-            <a:endParaRPr lang="en-US"/>
           </a:p>
         </p:txBody>
       </p:sp>
@@ -2490,38 +2488,37 @@
           <a:p>
             <a:pPr lvl="0"/>
             <a:r>
-              <a:rPr lang="en-US" smtClean="0"/>
+              <a:rPr lang="en-US"/>
               <a:t>Click to edit Master text styles</a:t>
             </a:r>
           </a:p>
           <a:p>
             <a:pPr lvl="1"/>
             <a:r>
-              <a:rPr lang="en-US" smtClean="0"/>
+              <a:rPr lang="en-US"/>
               <a:t>Second level</a:t>
             </a:r>
           </a:p>
           <a:p>
             <a:pPr lvl="2"/>
             <a:r>
-              <a:rPr lang="en-US" smtClean="0"/>
+              <a:rPr lang="en-US"/>
               <a:t>Third level</a:t>
             </a:r>
           </a:p>
           <a:p>
             <a:pPr lvl="3"/>
             <a:r>
-              <a:rPr lang="en-US" smtClean="0"/>
+              <a:rPr lang="en-US"/>
               <a:t>Fourth level</a:t>
             </a:r>
           </a:p>
           <a:p>
             <a:pPr lvl="4"/>
             <a:r>
-              <a:rPr lang="en-US" smtClean="0"/>
+              <a:rPr lang="en-US"/>
               <a:t>Fifth level</a:t>
             </a:r>
-            <a:endParaRPr lang="en-US"/>
           </a:p>
         </p:txBody>
       </p:sp>
@@ -2584,7 +2581,7 @@
           <a:p>
             <a:pPr lvl="0"/>
             <a:r>
-              <a:rPr lang="en-US" smtClean="0"/>
+              <a:rPr lang="en-US"/>
               <a:t>Click to edit Master text styles</a:t>
             </a:r>
           </a:p>
@@ -2607,7 +2604,7 @@
           <a:p>
             <a:fld id="{78C97017-6FC3-485B-9764-EAC9E56C1D49}" type="datetimeFigureOut">
               <a:rPr lang="en-US" smtClean="0"/>
-              <a:t>10/16/2016</a:t>
+              <a:t>10/11/2018</a:t>
             </a:fld>
             <a:endParaRPr lang="en-US"/>
           </a:p>
@@ -2710,10 +2707,9 @@
           </a:lstStyle>
           <a:p>
             <a:r>
-              <a:rPr lang="en-US" smtClean="0"/>
+              <a:rPr lang="en-US"/>
               <a:t>Click to edit Master title style</a:t>
             </a:r>
-            <a:endParaRPr lang="en-US"/>
           </a:p>
         </p:txBody>
       </p:sp>
@@ -2837,7 +2833,7 @@
           <a:p>
             <a:pPr lvl="0"/>
             <a:r>
-              <a:rPr lang="en-US" smtClean="0"/>
+              <a:rPr lang="en-US"/>
               <a:t>Click to edit Master text styles</a:t>
             </a:r>
           </a:p>
@@ -2860,7 +2856,7 @@
           <a:p>
             <a:fld id="{78C97017-6FC3-485B-9764-EAC9E56C1D49}" type="datetimeFigureOut">
               <a:rPr lang="en-US" smtClean="0"/>
-              <a:t>10/16/2016</a:t>
+              <a:t>10/11/2018</a:t>
             </a:fld>
             <a:endParaRPr lang="en-US"/>
           </a:p>
@@ -2969,10 +2965,9 @@
           <a:lstStyle/>
           <a:p>
             <a:r>
-              <a:rPr lang="en-US" smtClean="0"/>
+              <a:rPr lang="en-US"/>
               <a:t>Click to edit Master title style</a:t>
             </a:r>
-            <a:endParaRPr lang="en-US"/>
           </a:p>
         </p:txBody>
       </p:sp>
@@ -3003,38 +2998,37 @@
           <a:p>
             <a:pPr lvl="0"/>
             <a:r>
-              <a:rPr lang="en-US" smtClean="0"/>
+              <a:rPr lang="en-US"/>
               <a:t>Click to edit Master text styles</a:t>
             </a:r>
           </a:p>
           <a:p>
             <a:pPr lvl="1"/>
             <a:r>
-              <a:rPr lang="en-US" smtClean="0"/>
+              <a:rPr lang="en-US"/>
               <a:t>Second level</a:t>
             </a:r>
           </a:p>
           <a:p>
             <a:pPr lvl="2"/>
             <a:r>
-              <a:rPr lang="en-US" smtClean="0"/>
+              <a:rPr lang="en-US"/>
               <a:t>Third level</a:t>
             </a:r>
           </a:p>
           <a:p>
             <a:pPr lvl="3"/>
             <a:r>
-              <a:rPr lang="en-US" smtClean="0"/>
+              <a:rPr lang="en-US"/>
               <a:t>Fourth level</a:t>
             </a:r>
           </a:p>
           <a:p>
             <a:pPr lvl="4"/>
             <a:r>
-              <a:rPr lang="en-US" smtClean="0"/>
+              <a:rPr lang="en-US"/>
               <a:t>Fifth level</a:t>
             </a:r>
-            <a:endParaRPr lang="en-US"/>
           </a:p>
         </p:txBody>
       </p:sp>
@@ -3073,7 +3067,7 @@
           <a:p>
             <a:fld id="{78C97017-6FC3-485B-9764-EAC9E56C1D49}" type="datetimeFigureOut">
               <a:rPr lang="en-US" smtClean="0"/>
-              <a:t>10/16/2016</a:t>
+              <a:t>10/11/2018</a:t>
             </a:fld>
             <a:endParaRPr lang="en-US"/>
           </a:p>
@@ -3457,7 +3451,7 @@
         <p:spPr>
           <a:xfrm>
             <a:off x="1636188" y="2057400"/>
-            <a:ext cx="5700181" cy="2667000"/>
+            <a:ext cx="5871624" cy="2667000"/>
           </a:xfrm>
           <a:prstGeom prst="roundRect">
             <a:avLst>
@@ -3510,8 +3504,8 @@
         </p:nvSpPr>
         <p:spPr>
           <a:xfrm flipH="1">
-            <a:off x="1964269" y="2191178"/>
-            <a:ext cx="609602" cy="1294917"/>
+            <a:off x="1840991" y="2191178"/>
+            <a:ext cx="456336" cy="1559811"/>
           </a:xfrm>
           <a:prstGeom prst="roundRect">
             <a:avLst/>
@@ -3546,7 +3540,7 @@
           <a:p>
             <a:pPr algn="ctr"/>
             <a:r>
-              <a:rPr lang="en-US" sz="1600" dirty="0" smtClean="0">
+              <a:rPr lang="en-US" sz="1600" dirty="0">
                 <a:solidFill>
                   <a:schemeClr val="bg1"/>
                 </a:solidFill>
@@ -3605,7 +3599,7 @@
           <a:p>
             <a:pPr algn="ctr"/>
             <a:r>
-              <a:rPr lang="en-US" sz="1600" dirty="0" smtClean="0">
+              <a:rPr lang="en-US" sz="1600" dirty="0">
                 <a:solidFill>
                   <a:schemeClr val="bg1"/>
                 </a:solidFill>
@@ -3668,7 +3662,7 @@
           <a:p>
             <a:pPr algn="ctr"/>
             <a:r>
-              <a:rPr lang="en-US" sz="1600" dirty="0" smtClean="0">
+              <a:rPr lang="en-US" sz="1600" dirty="0">
                 <a:solidFill>
                   <a:schemeClr val="bg1"/>
                 </a:solidFill>
@@ -3691,8 +3685,8 @@
         </p:nvSpPr>
         <p:spPr>
           <a:xfrm>
-            <a:off x="3412069" y="3124200"/>
-            <a:ext cx="1295400" cy="723791"/>
+            <a:off x="3810000" y="2971083"/>
+            <a:ext cx="1295400" cy="970412"/>
           </a:xfrm>
           <a:prstGeom prst="roundRect">
             <a:avLst/>
@@ -3727,7 +3721,7 @@
           <a:p>
             <a:pPr algn="ctr"/>
             <a:r>
-              <a:rPr lang="en-US" sz="1600" dirty="0" smtClean="0">
+              <a:rPr lang="en-US" sz="1600" dirty="0">
                 <a:solidFill>
                   <a:schemeClr val="bg1"/>
                 </a:solidFill>
@@ -3750,7 +3744,7 @@
         </p:nvSpPr>
         <p:spPr>
           <a:xfrm>
-            <a:off x="3217846" y="4131994"/>
+            <a:off x="3501476" y="4131994"/>
             <a:ext cx="2658531" cy="444640"/>
           </a:xfrm>
           <a:prstGeom prst="roundRect">
@@ -3809,14 +3803,15 @@
         <p:nvCxnSpPr>
           <p:cNvPr id="10" name="Straight Arrow Connector 9"/>
           <p:cNvCxnSpPr>
+            <a:cxnSpLocks/>
             <a:endCxn id="3" idx="1"/>
           </p:cNvCxnSpPr>
           <p:nvPr/>
         </p:nvCxnSpPr>
         <p:spPr>
-          <a:xfrm>
-            <a:off x="2573871" y="2467189"/>
-            <a:ext cx="838198" cy="0"/>
+          <a:xfrm flipV="1">
+            <a:off x="2297327" y="2467189"/>
+            <a:ext cx="1114742" cy="9311"/>
           </a:xfrm>
           <a:prstGeom prst="straightConnector1">
             <a:avLst/>
@@ -3846,13 +3841,15 @@
       <p:cxnSp>
         <p:nvCxnSpPr>
           <p:cNvPr id="12" name="Straight Arrow Connector 11"/>
-          <p:cNvCxnSpPr/>
+          <p:cNvCxnSpPr>
+            <a:cxnSpLocks/>
+          </p:cNvCxnSpPr>
           <p:nvPr/>
         </p:nvCxnSpPr>
         <p:spPr>
-          <a:xfrm>
-            <a:off x="2569639" y="3276600"/>
-            <a:ext cx="838198" cy="0"/>
+          <a:xfrm flipV="1">
+            <a:off x="2309518" y="3630337"/>
+            <a:ext cx="1500482" cy="4692"/>
           </a:xfrm>
           <a:prstGeom prst="straightConnector1">
             <a:avLst/>
@@ -3883,15 +3880,15 @@
         <p:nvCxnSpPr>
           <p:cNvPr id="13" name="Straight Arrow Connector 12"/>
           <p:cNvCxnSpPr>
+            <a:cxnSpLocks/>
             <a:stCxn id="3" idx="2"/>
-            <a:endCxn id="5" idx="0"/>
           </p:cNvCxnSpPr>
           <p:nvPr/>
         </p:nvCxnSpPr>
         <p:spPr>
           <a:xfrm>
             <a:off x="4059769" y="2743200"/>
-            <a:ext cx="0" cy="381000"/>
+            <a:ext cx="0" cy="227883"/>
           </a:xfrm>
           <a:prstGeom prst="straightConnector1">
             <a:avLst/>
@@ -4005,13 +4002,15 @@
       <p:cxnSp>
         <p:nvCxnSpPr>
           <p:cNvPr id="32" name="Straight Arrow Connector 31"/>
-          <p:cNvCxnSpPr/>
+          <p:cNvCxnSpPr>
+            <a:cxnSpLocks/>
+          </p:cNvCxnSpPr>
           <p:nvPr/>
         </p:nvCxnSpPr>
         <p:spPr>
           <a:xfrm flipV="1">
-            <a:off x="1636188" y="2939996"/>
-            <a:ext cx="273050" cy="1"/>
+            <a:off x="1636188" y="2939997"/>
+            <a:ext cx="192612" cy="1"/>
           </a:xfrm>
           <a:prstGeom prst="straightConnector1">
             <a:avLst/>
@@ -4042,13 +4041,15 @@
       <p:cxnSp>
         <p:nvCxnSpPr>
           <p:cNvPr id="34" name="Straight Arrow Connector 33"/>
-          <p:cNvCxnSpPr/>
+          <p:cNvCxnSpPr>
+            <a:cxnSpLocks/>
+          </p:cNvCxnSpPr>
           <p:nvPr/>
         </p:nvCxnSpPr>
         <p:spPr>
           <a:xfrm flipV="1">
-            <a:off x="6680199" y="2467190"/>
-            <a:ext cx="939801" cy="1"/>
+            <a:off x="6680199" y="2467189"/>
+            <a:ext cx="1134539" cy="3"/>
           </a:xfrm>
           <a:prstGeom prst="straightConnector1">
             <a:avLst/>
@@ -4086,7 +4087,7 @@
         </p:nvSpPr>
         <p:spPr>
           <a:xfrm>
-            <a:off x="7679269" y="2286000"/>
+            <a:off x="7907869" y="2286000"/>
             <a:ext cx="381000" cy="381000"/>
           </a:xfrm>
           <a:prstGeom prst="foldedCorner">
@@ -4134,7 +4135,7 @@
         </p:nvSpPr>
         <p:spPr>
           <a:xfrm>
-            <a:off x="7772400" y="2362200"/>
+            <a:off x="8001000" y="2362200"/>
             <a:ext cx="381000" cy="381000"/>
           </a:xfrm>
           <a:prstGeom prst="foldedCorner">
@@ -4233,6 +4234,7 @@
         <p:nvCxnSpPr>
           <p:cNvPr id="52" name="Elbow Connector 51"/>
           <p:cNvCxnSpPr>
+            <a:cxnSpLocks/>
             <a:stCxn id="2" idx="0"/>
             <a:endCxn id="51" idx="2"/>
           </p:cNvCxnSpPr>
@@ -4240,8 +4242,8 @@
         </p:nvCxnSpPr>
         <p:spPr>
           <a:xfrm rot="5400000" flipH="1" flipV="1">
-            <a:off x="2222648" y="1760922"/>
-            <a:ext cx="476678" cy="383835"/>
+            <a:off x="2122693" y="1660966"/>
+            <a:ext cx="476678" cy="583746"/>
           </a:xfrm>
           <a:prstGeom prst="bentConnector2">
             <a:avLst/>
@@ -4277,7 +4279,7 @@
         </p:nvSpPr>
         <p:spPr>
           <a:xfrm flipH="1">
-            <a:off x="1964269" y="3959459"/>
+            <a:off x="1807631" y="4093835"/>
             <a:ext cx="778931" cy="570908"/>
           </a:xfrm>
           <a:prstGeom prst="roundRect">
@@ -4313,7 +4315,7 @@
           <a:p>
             <a:pPr algn="ctr"/>
             <a:r>
-              <a:rPr lang="en-US" sz="1600" dirty="0" smtClean="0">
+              <a:rPr lang="en-US" sz="1600" dirty="0">
                 <a:solidFill>
                   <a:schemeClr val="bg1"/>
                 </a:solidFill>
@@ -4336,7 +4338,7 @@
         </p:nvCxnSpPr>
         <p:spPr>
           <a:xfrm>
-            <a:off x="4945047" y="3750994"/>
+            <a:off x="5228677" y="3750994"/>
             <a:ext cx="0" cy="381000"/>
           </a:xfrm>
           <a:prstGeom prst="straightConnector1">
@@ -4375,7 +4377,7 @@
         </p:nvCxnSpPr>
         <p:spPr>
           <a:xfrm>
-            <a:off x="5097447" y="3761908"/>
+            <a:off x="5381077" y="3761908"/>
             <a:ext cx="0" cy="381000"/>
           </a:xfrm>
           <a:prstGeom prst="straightConnector1">
@@ -4414,7 +4416,7 @@
         </p:nvCxnSpPr>
         <p:spPr>
           <a:xfrm>
-            <a:off x="5249847" y="3750994"/>
+            <a:off x="5533477" y="3750994"/>
             <a:ext cx="0" cy="381000"/>
           </a:xfrm>
           <a:prstGeom prst="straightConnector1">
@@ -4455,7 +4457,7 @@
         </p:nvCxnSpPr>
         <p:spPr>
           <a:xfrm>
-            <a:off x="2743200" y="4244913"/>
+            <a:off x="2586562" y="4379289"/>
             <a:ext cx="249770" cy="0"/>
           </a:xfrm>
           <a:prstGeom prst="straightConnector1">
@@ -4492,7 +4494,7 @@
         </p:nvCxnSpPr>
         <p:spPr>
           <a:xfrm rot="13867188">
-            <a:off x="2743200" y="3755022"/>
+            <a:off x="2586562" y="3889398"/>
             <a:ext cx="0" cy="381000"/>
           </a:xfrm>
           <a:prstGeom prst="straightConnector1">
@@ -4529,7 +4531,7 @@
         </p:nvCxnSpPr>
         <p:spPr>
           <a:xfrm flipV="1">
-            <a:off x="2353734" y="3697061"/>
+            <a:off x="2197096" y="3831437"/>
             <a:ext cx="0" cy="301859"/>
           </a:xfrm>
           <a:prstGeom prst="straightConnector1">
@@ -4566,7 +4568,7 @@
         </p:nvSpPr>
         <p:spPr>
           <a:xfrm>
-            <a:off x="4936069" y="2909316"/>
+            <a:off x="5219699" y="2909316"/>
             <a:ext cx="1219201" cy="533400"/>
           </a:xfrm>
           <a:prstGeom prst="ellipse">
@@ -4624,7 +4626,7 @@
         </p:nvSpPr>
         <p:spPr>
           <a:xfrm>
-            <a:off x="5888569" y="3515641"/>
+            <a:off x="6172199" y="3515641"/>
             <a:ext cx="1219201" cy="533400"/>
           </a:xfrm>
           <a:prstGeom prst="ellipse">
@@ -4664,7 +4666,7 @@
           <a:p>
             <a:pPr algn="ctr"/>
             <a:r>
-              <a:rPr lang="en-US" sz="1600" dirty="0" smtClean="0">
+              <a:rPr lang="en-US" sz="1600" dirty="0">
                 <a:solidFill>
                   <a:schemeClr val="bg1"/>
                 </a:solidFill>
@@ -4672,25 +4674,20 @@
               <a:t>Logs</a:t>
             </a:r>
             <a:br>
-              <a:rPr lang="en-US" sz="1600" dirty="0" smtClean="0">
+              <a:rPr lang="en-US" sz="1600" dirty="0">
                 <a:solidFill>
                   <a:schemeClr val="bg1"/>
                 </a:solidFill>
               </a:rPr>
             </a:br>
             <a:r>
-              <a:rPr lang="en-US" sz="1600" dirty="0" smtClean="0">
+              <a:rPr lang="en-US" sz="1600" dirty="0">
                 <a:solidFill>
                   <a:schemeClr val="bg1"/>
                 </a:solidFill>
               </a:rPr>
               <a:t>Center</a:t>
             </a:r>
-            <a:endParaRPr lang="en-US" sz="1600" dirty="0">
-              <a:solidFill>
-                <a:schemeClr val="bg1"/>
-              </a:solidFill>
-            </a:endParaRPr>
           </a:p>
         </p:txBody>
       </p:sp>
@@ -4705,7 +4702,7 @@
         </p:nvCxnSpPr>
         <p:spPr>
           <a:xfrm rot="5400000">
-            <a:off x="6034638" y="3890781"/>
+            <a:off x="6318268" y="3890781"/>
             <a:ext cx="305273" cy="621793"/>
           </a:xfrm>
           <a:prstGeom prst="bentConnector2">
@@ -4744,7 +4741,7 @@
         </p:nvCxnSpPr>
         <p:spPr>
           <a:xfrm rot="5400000">
-            <a:off x="5195574" y="3792812"/>
+            <a:off x="5479204" y="3792812"/>
             <a:ext cx="700192" cy="1"/>
           </a:xfrm>
           <a:prstGeom prst="bentConnector3">
@@ -4756,6 +4753,160 @@
                 <a:lumMod val="75000"/>
               </a:schemeClr>
             </a:solidFill>
+          </a:ln>
+        </p:spPr>
+        <p:style>
+          <a:lnRef idx="1">
+            <a:schemeClr val="accent1"/>
+          </a:lnRef>
+          <a:fillRef idx="0">
+            <a:schemeClr val="accent1"/>
+          </a:fillRef>
+          <a:effectRef idx="0">
+            <a:schemeClr val="accent1"/>
+          </a:effectRef>
+          <a:fontRef idx="minor">
+            <a:schemeClr val="tx1"/>
+          </a:fontRef>
+        </p:style>
+      </p:cxnSp>
+      <p:sp>
+        <p:nvSpPr>
+          <p:cNvPr id="41" name="Rectangle 62">
+            <a:extLst>
+              <a:ext uri="{FF2B5EF4-FFF2-40B4-BE49-F238E27FC236}">
+                <a16:creationId xmlns:a16="http://schemas.microsoft.com/office/drawing/2014/main" id="{B7AFF4FB-6A6C-442B-9482-0DABC0694F61}"/>
+              </a:ext>
+            </a:extLst>
+          </p:cNvPr>
+          <p:cNvSpPr/>
+          <p:nvPr/>
+        </p:nvSpPr>
+        <p:spPr>
+          <a:xfrm flipH="1">
+            <a:off x="2516714" y="3045169"/>
+            <a:ext cx="973669" cy="460031"/>
+          </a:xfrm>
+          <a:prstGeom prst="roundRect">
+            <a:avLst/>
+          </a:prstGeom>
+          <a:solidFill>
+            <a:schemeClr val="tx1"/>
+          </a:solidFill>
+          <a:ln w="19050">
+            <a:solidFill>
+              <a:schemeClr val="tx1"/>
+            </a:solidFill>
+          </a:ln>
+          <a:effectLst/>
+        </p:spPr>
+        <p:style>
+          <a:lnRef idx="1">
+            <a:schemeClr val="accent2"/>
+          </a:lnRef>
+          <a:fillRef idx="2">
+            <a:schemeClr val="accent2"/>
+          </a:fillRef>
+          <a:effectRef idx="1">
+            <a:schemeClr val="accent2"/>
+          </a:effectRef>
+          <a:fontRef idx="minor">
+            <a:schemeClr val="dk1"/>
+          </a:fontRef>
+        </p:style>
+        <p:txBody>
+          <a:bodyPr rtlCol="0" anchor="ctr"/>
+          <a:lstStyle/>
+          <a:p>
+            <a:pPr algn="ctr"/>
+            <a:r>
+              <a:rPr lang="en-US" sz="1600" dirty="0">
+                <a:solidFill>
+                  <a:schemeClr val="bg1"/>
+                </a:solidFill>
+              </a:rPr>
+              <a:t>Security</a:t>
+            </a:r>
+            <a:endParaRPr lang="en-SG" sz="1600" dirty="0">
+              <a:solidFill>
+                <a:schemeClr val="bg1"/>
+              </a:solidFill>
+            </a:endParaRPr>
+          </a:p>
+        </p:txBody>
+      </p:sp>
+      <p:cxnSp>
+        <p:nvCxnSpPr>
+          <p:cNvPr id="49" name="Straight Arrow Connector 48">
+            <a:extLst>
+              <a:ext uri="{FF2B5EF4-FFF2-40B4-BE49-F238E27FC236}">
+                <a16:creationId xmlns:a16="http://schemas.microsoft.com/office/drawing/2014/main" id="{6A23F6BB-1D29-4605-ABF4-7CA4902BF9E8}"/>
+              </a:ext>
+            </a:extLst>
+          </p:cNvPr>
+          <p:cNvCxnSpPr>
+            <a:cxnSpLocks/>
+            <a:endCxn id="41" idx="3"/>
+          </p:cNvCxnSpPr>
+          <p:nvPr/>
+        </p:nvCxnSpPr>
+        <p:spPr>
+          <a:xfrm>
+            <a:off x="2069159" y="3275185"/>
+            <a:ext cx="447555" cy="0"/>
+          </a:xfrm>
+          <a:prstGeom prst="straightConnector1">
+            <a:avLst/>
+          </a:prstGeom>
+          <a:ln w="28575">
+            <a:solidFill>
+              <a:srgbClr val="00B050"/>
+            </a:solidFill>
+            <a:tailEnd type="arrow"/>
+          </a:ln>
+        </p:spPr>
+        <p:style>
+          <a:lnRef idx="1">
+            <a:schemeClr val="accent1"/>
+          </a:lnRef>
+          <a:fillRef idx="0">
+            <a:schemeClr val="accent1"/>
+          </a:fillRef>
+          <a:effectRef idx="0">
+            <a:schemeClr val="accent1"/>
+          </a:effectRef>
+          <a:fontRef idx="minor">
+            <a:schemeClr val="tx1"/>
+          </a:fontRef>
+        </p:style>
+      </p:cxnSp>
+      <p:cxnSp>
+        <p:nvCxnSpPr>
+          <p:cNvPr id="55" name="Straight Arrow Connector 54">
+            <a:extLst>
+              <a:ext uri="{FF2B5EF4-FFF2-40B4-BE49-F238E27FC236}">
+                <a16:creationId xmlns:a16="http://schemas.microsoft.com/office/drawing/2014/main" id="{8E5E6AAF-B614-41B7-8BED-454BCE6D9B96}"/>
+              </a:ext>
+            </a:extLst>
+          </p:cNvPr>
+          <p:cNvCxnSpPr>
+            <a:cxnSpLocks/>
+          </p:cNvCxnSpPr>
+          <p:nvPr/>
+        </p:nvCxnSpPr>
+        <p:spPr>
+          <a:xfrm>
+            <a:off x="3362445" y="3261985"/>
+            <a:ext cx="447555" cy="0"/>
+          </a:xfrm>
+          <a:prstGeom prst="straightConnector1">
+            <a:avLst/>
+          </a:prstGeom>
+          <a:ln w="28575">
+            <a:solidFill>
+              <a:schemeClr val="tx1"/>
+            </a:solidFill>
+            <a:tailEnd type="arrow"/>
           </a:ln>
         </p:spPr>
         <p:style>

</xml_diff>

<commit_message>
Updated DG with relevant images and ppx
</commit_message>
<xml_diff>
--- a/docs/diagrams/ArchitectureDiagram.pptx
+++ b/docs/diagrams/ArchitectureDiagram.pptx
@@ -208,7 +208,7 @@
           <a:p>
             <a:fld id="{F5CC4B3F-88C1-4FFA-B1B6-F41C21DC6924}" type="datetimeFigureOut">
               <a:rPr lang="en-US" smtClean="0"/>
-              <a:t>10/11/2018</a:t>
+              <a:t>10/28/2018</a:t>
             </a:fld>
             <a:endParaRPr lang="en-US"/>
           </a:p>
@@ -654,7 +654,7 @@
           <a:p>
             <a:fld id="{78C97017-6FC3-485B-9764-EAC9E56C1D49}" type="datetimeFigureOut">
               <a:rPr lang="en-US" smtClean="0"/>
-              <a:t>10/11/2018</a:t>
+              <a:t>10/28/2018</a:t>
             </a:fld>
             <a:endParaRPr lang="en-US"/>
           </a:p>
@@ -822,7 +822,7 @@
           <a:p>
             <a:fld id="{78C97017-6FC3-485B-9764-EAC9E56C1D49}" type="datetimeFigureOut">
               <a:rPr lang="en-US" smtClean="0"/>
-              <a:t>10/11/2018</a:t>
+              <a:t>10/28/2018</a:t>
             </a:fld>
             <a:endParaRPr lang="en-US"/>
           </a:p>
@@ -1000,7 +1000,7 @@
           <a:p>
             <a:fld id="{78C97017-6FC3-485B-9764-EAC9E56C1D49}" type="datetimeFigureOut">
               <a:rPr lang="en-US" smtClean="0"/>
-              <a:t>10/11/2018</a:t>
+              <a:t>10/28/2018</a:t>
             </a:fld>
             <a:endParaRPr lang="en-US"/>
           </a:p>
@@ -1168,7 +1168,7 @@
           <a:p>
             <a:fld id="{78C97017-6FC3-485B-9764-EAC9E56C1D49}" type="datetimeFigureOut">
               <a:rPr lang="en-US" smtClean="0"/>
-              <a:t>10/11/2018</a:t>
+              <a:t>10/28/2018</a:t>
             </a:fld>
             <a:endParaRPr lang="en-US"/>
           </a:p>
@@ -1413,7 +1413,7 @@
           <a:p>
             <a:fld id="{78C97017-6FC3-485B-9764-EAC9E56C1D49}" type="datetimeFigureOut">
               <a:rPr lang="en-US" smtClean="0"/>
-              <a:t>10/11/2018</a:t>
+              <a:t>10/28/2018</a:t>
             </a:fld>
             <a:endParaRPr lang="en-US"/>
           </a:p>
@@ -1698,7 +1698,7 @@
           <a:p>
             <a:fld id="{78C97017-6FC3-485B-9764-EAC9E56C1D49}" type="datetimeFigureOut">
               <a:rPr lang="en-US" smtClean="0"/>
-              <a:t>10/11/2018</a:t>
+              <a:t>10/28/2018</a:t>
             </a:fld>
             <a:endParaRPr lang="en-US"/>
           </a:p>
@@ -2117,7 +2117,7 @@
           <a:p>
             <a:fld id="{78C97017-6FC3-485B-9764-EAC9E56C1D49}" type="datetimeFigureOut">
               <a:rPr lang="en-US" smtClean="0"/>
-              <a:t>10/11/2018</a:t>
+              <a:t>10/28/2018</a:t>
             </a:fld>
             <a:endParaRPr lang="en-US"/>
           </a:p>
@@ -2234,7 +2234,7 @@
           <a:p>
             <a:fld id="{78C97017-6FC3-485B-9764-EAC9E56C1D49}" type="datetimeFigureOut">
               <a:rPr lang="en-US" smtClean="0"/>
-              <a:t>10/11/2018</a:t>
+              <a:t>10/28/2018</a:t>
             </a:fld>
             <a:endParaRPr lang="en-US"/>
           </a:p>
@@ -2329,7 +2329,7 @@
           <a:p>
             <a:fld id="{78C97017-6FC3-485B-9764-EAC9E56C1D49}" type="datetimeFigureOut">
               <a:rPr lang="en-US" smtClean="0"/>
-              <a:t>10/11/2018</a:t>
+              <a:t>10/28/2018</a:t>
             </a:fld>
             <a:endParaRPr lang="en-US"/>
           </a:p>
@@ -2604,7 +2604,7 @@
           <a:p>
             <a:fld id="{78C97017-6FC3-485B-9764-EAC9E56C1D49}" type="datetimeFigureOut">
               <a:rPr lang="en-US" smtClean="0"/>
-              <a:t>10/11/2018</a:t>
+              <a:t>10/28/2018</a:t>
             </a:fld>
             <a:endParaRPr lang="en-US"/>
           </a:p>
@@ -2856,7 +2856,7 @@
           <a:p>
             <a:fld id="{78C97017-6FC3-485B-9764-EAC9E56C1D49}" type="datetimeFigureOut">
               <a:rPr lang="en-US" smtClean="0"/>
-              <a:t>10/11/2018</a:t>
+              <a:t>10/28/2018</a:t>
             </a:fld>
             <a:endParaRPr lang="en-US"/>
           </a:p>
@@ -3067,7 +3067,7 @@
           <a:p>
             <a:fld id="{78C97017-6FC3-485B-9764-EAC9E56C1D49}" type="datetimeFigureOut">
               <a:rPr lang="en-US" smtClean="0"/>
-              <a:t>10/11/2018</a:t>
+              <a:t>10/28/2018</a:t>
             </a:fld>
             <a:endParaRPr lang="en-US"/>
           </a:p>
@@ -3563,8 +3563,8 @@
         </p:nvSpPr>
         <p:spPr>
           <a:xfrm>
-            <a:off x="3412069" y="2191178"/>
-            <a:ext cx="1295400" cy="552022"/>
+            <a:off x="3814320" y="2176250"/>
+            <a:ext cx="1295400" cy="812506"/>
           </a:xfrm>
           <a:prstGeom prst="roundRect">
             <a:avLst/>
@@ -3622,7 +3622,7 @@
         </p:nvSpPr>
         <p:spPr>
           <a:xfrm>
-            <a:off x="5164669" y="2191179"/>
+            <a:off x="5564712" y="2180905"/>
             <a:ext cx="1447800" cy="552022"/>
           </a:xfrm>
           <a:prstGeom prst="roundRect">
@@ -3685,8 +3685,8 @@
         </p:nvSpPr>
         <p:spPr>
           <a:xfrm>
-            <a:off x="3810000" y="2971083"/>
-            <a:ext cx="1295400" cy="970412"/>
+            <a:off x="3810000" y="3295221"/>
+            <a:ext cx="1295400" cy="646273"/>
           </a:xfrm>
           <a:prstGeom prst="roundRect">
             <a:avLst/>
@@ -3804,14 +3804,13 @@
           <p:cNvPr id="10" name="Straight Arrow Connector 9"/>
           <p:cNvCxnSpPr>
             <a:cxnSpLocks/>
-            <a:endCxn id="3" idx="1"/>
           </p:cNvCxnSpPr>
           <p:nvPr/>
         </p:nvCxnSpPr>
         <p:spPr>
           <a:xfrm flipV="1">
-            <a:off x="2297327" y="2467189"/>
-            <a:ext cx="1114742" cy="9311"/>
+            <a:off x="2297327" y="2428115"/>
+            <a:ext cx="1512673" cy="10684"/>
           </a:xfrm>
           <a:prstGeom prst="straightConnector1">
             <a:avLst/>
@@ -3881,14 +3880,14 @@
           <p:cNvPr id="13" name="Straight Arrow Connector 12"/>
           <p:cNvCxnSpPr>
             <a:cxnSpLocks/>
-            <a:stCxn id="3" idx="2"/>
+            <a:endCxn id="5" idx="0"/>
           </p:cNvCxnSpPr>
           <p:nvPr/>
         </p:nvCxnSpPr>
         <p:spPr>
           <a:xfrm>
-            <a:off x="4059769" y="2743200"/>
-            <a:ext cx="0" cy="227883"/>
+            <a:off x="4457700" y="2971083"/>
+            <a:ext cx="0" cy="324138"/>
           </a:xfrm>
           <a:prstGeom prst="straightConnector1">
             <a:avLst/>
@@ -3923,7 +3922,7 @@
         </p:nvCxnSpPr>
         <p:spPr>
           <a:xfrm>
-            <a:off x="4707469" y="2467189"/>
+            <a:off x="5109720" y="2452261"/>
             <a:ext cx="457200" cy="0"/>
           </a:xfrm>
           <a:prstGeom prst="straightConnector1">
@@ -4784,7 +4783,7 @@
         </p:nvSpPr>
         <p:spPr>
           <a:xfrm flipH="1">
-            <a:off x="2516714" y="3045169"/>
+            <a:off x="2516801" y="2593387"/>
             <a:ext cx="973669" cy="460031"/>
           </a:xfrm>
           <a:prstGeom prst="roundRect">
@@ -4852,7 +4851,7 @@
         </p:nvCxnSpPr>
         <p:spPr>
           <a:xfrm>
-            <a:off x="2069159" y="3275185"/>
+            <a:off x="2069246" y="2823403"/>
             <a:ext cx="447555" cy="0"/>
           </a:xfrm>
           <a:prstGeom prst="straightConnector1">
@@ -4896,7 +4895,7 @@
         </p:nvCxnSpPr>
         <p:spPr>
           <a:xfrm>
-            <a:off x="3362445" y="3261985"/>
+            <a:off x="3362532" y="2810203"/>
             <a:ext cx="447555" cy="0"/>
           </a:xfrm>
           <a:prstGeom prst="straightConnector1">

</xml_diff>

<commit_message>
Updated architecture in dev guide
</commit_message>
<xml_diff>
--- a/docs/diagrams/ArchitectureDiagram.pptx
+++ b/docs/diagrams/ArchitectureDiagram.pptx
@@ -107,6 +107,22 @@
       </a:defRPr>
     </a:lvl9pPr>
   </p:defaultTextStyle>
+  <p:extLst>
+    <p:ext uri="{EFAFB233-063F-42B5-8137-9DF3F51BA10A}">
+      <p15:sldGuideLst xmlns:p15="http://schemas.microsoft.com/office/powerpoint/2012/main">
+        <p15:guide id="1" orient="horz" pos="1488">
+          <p15:clr>
+            <a:srgbClr val="A4A3A4"/>
+          </p15:clr>
+        </p15:guide>
+        <p15:guide id="2" pos="2880">
+          <p15:clr>
+            <a:srgbClr val="A4A3A4"/>
+          </p15:clr>
+        </p15:guide>
+      </p15:sldGuideLst>
+    </p:ext>
+  </p:extLst>
 </p:presentation>
 </file>
 
@@ -192,7 +208,7 @@
           <a:p>
             <a:fld id="{F5CC4B3F-88C1-4FFA-B1B6-F41C21DC6924}" type="datetimeFigureOut">
               <a:rPr lang="en-US" smtClean="0"/>
-              <a:t>10/16/2016</a:t>
+              <a:t>10/31/2018</a:t>
             </a:fld>
             <a:endParaRPr lang="en-US"/>
           </a:p>
@@ -256,38 +272,37 @@
           <a:p>
             <a:pPr lvl="0"/>
             <a:r>
-              <a:rPr lang="en-US" smtClean="0"/>
+              <a:rPr lang="en-US"/>
               <a:t>Click to edit Master text styles</a:t>
             </a:r>
           </a:p>
           <a:p>
             <a:pPr lvl="1"/>
             <a:r>
-              <a:rPr lang="en-US" smtClean="0"/>
+              <a:rPr lang="en-US"/>
               <a:t>Second level</a:t>
             </a:r>
           </a:p>
           <a:p>
             <a:pPr lvl="2"/>
             <a:r>
-              <a:rPr lang="en-US" smtClean="0"/>
+              <a:rPr lang="en-US"/>
               <a:t>Third level</a:t>
             </a:r>
           </a:p>
           <a:p>
             <a:pPr lvl="3"/>
             <a:r>
-              <a:rPr lang="en-US" smtClean="0"/>
+              <a:rPr lang="en-US"/>
               <a:t>Fourth level</a:t>
             </a:r>
           </a:p>
           <a:p>
             <a:pPr lvl="4"/>
             <a:r>
-              <a:rPr lang="en-US" smtClean="0"/>
+              <a:rPr lang="en-US"/>
               <a:t>Fifth level</a:t>
             </a:r>
-            <a:endParaRPr lang="en-US"/>
           </a:p>
         </p:txBody>
       </p:sp>
@@ -498,10 +513,9 @@
           <a:lstStyle/>
           <a:p>
             <a:r>
-              <a:rPr lang="en-US" smtClean="0"/>
+              <a:rPr lang="en-US"/>
               <a:t>Click to edit Master title style</a:t>
             </a:r>
-            <a:endParaRPr lang="en-US"/>
           </a:p>
         </p:txBody>
       </p:sp>
@@ -617,10 +631,9 @@
           </a:lstStyle>
           <a:p>
             <a:r>
-              <a:rPr lang="en-US" smtClean="0"/>
+              <a:rPr lang="en-US"/>
               <a:t>Click to edit Master subtitle style</a:t>
             </a:r>
-            <a:endParaRPr lang="en-US"/>
           </a:p>
         </p:txBody>
       </p:sp>
@@ -641,7 +654,7 @@
           <a:p>
             <a:fld id="{78C97017-6FC3-485B-9764-EAC9E56C1D49}" type="datetimeFigureOut">
               <a:rPr lang="en-US" smtClean="0"/>
-              <a:t>10/16/2016</a:t>
+              <a:t>10/31/2018</a:t>
             </a:fld>
             <a:endParaRPr lang="en-US"/>
           </a:p>
@@ -735,10 +748,9 @@
           <a:lstStyle/>
           <a:p>
             <a:r>
-              <a:rPr lang="en-US" smtClean="0"/>
+              <a:rPr lang="en-US"/>
               <a:t>Click to edit Master title style</a:t>
             </a:r>
-            <a:endParaRPr lang="en-US"/>
           </a:p>
         </p:txBody>
       </p:sp>
@@ -759,38 +771,37 @@
           <a:p>
             <a:pPr lvl="0"/>
             <a:r>
-              <a:rPr lang="en-US" smtClean="0"/>
+              <a:rPr lang="en-US"/>
               <a:t>Click to edit Master text styles</a:t>
             </a:r>
           </a:p>
           <a:p>
             <a:pPr lvl="1"/>
             <a:r>
-              <a:rPr lang="en-US" smtClean="0"/>
+              <a:rPr lang="en-US"/>
               <a:t>Second level</a:t>
             </a:r>
           </a:p>
           <a:p>
             <a:pPr lvl="2"/>
             <a:r>
-              <a:rPr lang="en-US" smtClean="0"/>
+              <a:rPr lang="en-US"/>
               <a:t>Third level</a:t>
             </a:r>
           </a:p>
           <a:p>
             <a:pPr lvl="3"/>
             <a:r>
-              <a:rPr lang="en-US" smtClean="0"/>
+              <a:rPr lang="en-US"/>
               <a:t>Fourth level</a:t>
             </a:r>
           </a:p>
           <a:p>
             <a:pPr lvl="4"/>
             <a:r>
-              <a:rPr lang="en-US" smtClean="0"/>
+              <a:rPr lang="en-US"/>
               <a:t>Fifth level</a:t>
             </a:r>
-            <a:endParaRPr lang="en-US"/>
           </a:p>
         </p:txBody>
       </p:sp>
@@ -811,7 +822,7 @@
           <a:p>
             <a:fld id="{78C97017-6FC3-485B-9764-EAC9E56C1D49}" type="datetimeFigureOut">
               <a:rPr lang="en-US" smtClean="0"/>
-              <a:t>10/16/2016</a:t>
+              <a:t>10/31/2018</a:t>
             </a:fld>
             <a:endParaRPr lang="en-US"/>
           </a:p>
@@ -910,10 +921,9 @@
           <a:lstStyle/>
           <a:p>
             <a:r>
-              <a:rPr lang="en-US" smtClean="0"/>
+              <a:rPr lang="en-US"/>
               <a:t>Click to edit Master title style</a:t>
             </a:r>
-            <a:endParaRPr lang="en-US"/>
           </a:p>
         </p:txBody>
       </p:sp>
@@ -939,38 +949,37 @@
           <a:p>
             <a:pPr lvl="0"/>
             <a:r>
-              <a:rPr lang="en-US" smtClean="0"/>
+              <a:rPr lang="en-US"/>
               <a:t>Click to edit Master text styles</a:t>
             </a:r>
           </a:p>
           <a:p>
             <a:pPr lvl="1"/>
             <a:r>
-              <a:rPr lang="en-US" smtClean="0"/>
+              <a:rPr lang="en-US"/>
               <a:t>Second level</a:t>
             </a:r>
           </a:p>
           <a:p>
             <a:pPr lvl="2"/>
             <a:r>
-              <a:rPr lang="en-US" smtClean="0"/>
+              <a:rPr lang="en-US"/>
               <a:t>Third level</a:t>
             </a:r>
           </a:p>
           <a:p>
             <a:pPr lvl="3"/>
             <a:r>
-              <a:rPr lang="en-US" smtClean="0"/>
+              <a:rPr lang="en-US"/>
               <a:t>Fourth level</a:t>
             </a:r>
           </a:p>
           <a:p>
             <a:pPr lvl="4"/>
             <a:r>
-              <a:rPr lang="en-US" smtClean="0"/>
+              <a:rPr lang="en-US"/>
               <a:t>Fifth level</a:t>
             </a:r>
-            <a:endParaRPr lang="en-US"/>
           </a:p>
         </p:txBody>
       </p:sp>
@@ -991,7 +1000,7 @@
           <a:p>
             <a:fld id="{78C97017-6FC3-485B-9764-EAC9E56C1D49}" type="datetimeFigureOut">
               <a:rPr lang="en-US" smtClean="0"/>
-              <a:t>10/16/2016</a:t>
+              <a:t>10/31/2018</a:t>
             </a:fld>
             <a:endParaRPr lang="en-US"/>
           </a:p>
@@ -1085,10 +1094,9 @@
           <a:lstStyle/>
           <a:p>
             <a:r>
-              <a:rPr lang="en-US" smtClean="0"/>
+              <a:rPr lang="en-US"/>
               <a:t>Click to edit Master title style</a:t>
             </a:r>
-            <a:endParaRPr lang="en-US"/>
           </a:p>
         </p:txBody>
       </p:sp>
@@ -1109,38 +1117,37 @@
           <a:p>
             <a:pPr lvl="0"/>
             <a:r>
-              <a:rPr lang="en-US" smtClean="0"/>
+              <a:rPr lang="en-US"/>
               <a:t>Click to edit Master text styles</a:t>
             </a:r>
           </a:p>
           <a:p>
             <a:pPr lvl="1"/>
             <a:r>
-              <a:rPr lang="en-US" smtClean="0"/>
+              <a:rPr lang="en-US"/>
               <a:t>Second level</a:t>
             </a:r>
           </a:p>
           <a:p>
             <a:pPr lvl="2"/>
             <a:r>
-              <a:rPr lang="en-US" smtClean="0"/>
+              <a:rPr lang="en-US"/>
               <a:t>Third level</a:t>
             </a:r>
           </a:p>
           <a:p>
             <a:pPr lvl="3"/>
             <a:r>
-              <a:rPr lang="en-US" smtClean="0"/>
+              <a:rPr lang="en-US"/>
               <a:t>Fourth level</a:t>
             </a:r>
           </a:p>
           <a:p>
             <a:pPr lvl="4"/>
             <a:r>
-              <a:rPr lang="en-US" smtClean="0"/>
+              <a:rPr lang="en-US"/>
               <a:t>Fifth level</a:t>
             </a:r>
-            <a:endParaRPr lang="en-US"/>
           </a:p>
         </p:txBody>
       </p:sp>
@@ -1161,7 +1168,7 @@
           <a:p>
             <a:fld id="{78C97017-6FC3-485B-9764-EAC9E56C1D49}" type="datetimeFigureOut">
               <a:rPr lang="en-US" smtClean="0"/>
-              <a:t>10/16/2016</a:t>
+              <a:t>10/31/2018</a:t>
             </a:fld>
             <a:endParaRPr lang="en-US"/>
           </a:p>
@@ -1264,10 +1271,9 @@
           </a:lstStyle>
           <a:p>
             <a:r>
-              <a:rPr lang="en-US" smtClean="0"/>
+              <a:rPr lang="en-US"/>
               <a:t>Click to edit Master title style</a:t>
             </a:r>
-            <a:endParaRPr lang="en-US"/>
           </a:p>
         </p:txBody>
       </p:sp>
@@ -1384,7 +1390,7 @@
           <a:p>
             <a:pPr lvl="0"/>
             <a:r>
-              <a:rPr lang="en-US" smtClean="0"/>
+              <a:rPr lang="en-US"/>
               <a:t>Click to edit Master text styles</a:t>
             </a:r>
           </a:p>
@@ -1407,7 +1413,7 @@
           <a:p>
             <a:fld id="{78C97017-6FC3-485B-9764-EAC9E56C1D49}" type="datetimeFigureOut">
               <a:rPr lang="en-US" smtClean="0"/>
-              <a:t>10/16/2016</a:t>
+              <a:t>10/31/2018</a:t>
             </a:fld>
             <a:endParaRPr lang="en-US"/>
           </a:p>
@@ -1501,10 +1507,9 @@
           <a:lstStyle/>
           <a:p>
             <a:r>
-              <a:rPr lang="en-US" smtClean="0"/>
+              <a:rPr lang="en-US"/>
               <a:t>Click to edit Master title style</a:t>
             </a:r>
-            <a:endParaRPr lang="en-US"/>
           </a:p>
         </p:txBody>
       </p:sp>
@@ -1558,38 +1563,37 @@
           <a:p>
             <a:pPr lvl="0"/>
             <a:r>
-              <a:rPr lang="en-US" smtClean="0"/>
+              <a:rPr lang="en-US"/>
               <a:t>Click to edit Master text styles</a:t>
             </a:r>
           </a:p>
           <a:p>
             <a:pPr lvl="1"/>
             <a:r>
-              <a:rPr lang="en-US" smtClean="0"/>
+              <a:rPr lang="en-US"/>
               <a:t>Second level</a:t>
             </a:r>
           </a:p>
           <a:p>
             <a:pPr lvl="2"/>
             <a:r>
-              <a:rPr lang="en-US" smtClean="0"/>
+              <a:rPr lang="en-US"/>
               <a:t>Third level</a:t>
             </a:r>
           </a:p>
           <a:p>
             <a:pPr lvl="3"/>
             <a:r>
-              <a:rPr lang="en-US" smtClean="0"/>
+              <a:rPr lang="en-US"/>
               <a:t>Fourth level</a:t>
             </a:r>
           </a:p>
           <a:p>
             <a:pPr lvl="4"/>
             <a:r>
-              <a:rPr lang="en-US" smtClean="0"/>
+              <a:rPr lang="en-US"/>
               <a:t>Fifth level</a:t>
             </a:r>
-            <a:endParaRPr lang="en-US"/>
           </a:p>
         </p:txBody>
       </p:sp>
@@ -1643,38 +1647,37 @@
           <a:p>
             <a:pPr lvl="0"/>
             <a:r>
-              <a:rPr lang="en-US" smtClean="0"/>
+              <a:rPr lang="en-US"/>
               <a:t>Click to edit Master text styles</a:t>
             </a:r>
           </a:p>
           <a:p>
             <a:pPr lvl="1"/>
             <a:r>
-              <a:rPr lang="en-US" smtClean="0"/>
+              <a:rPr lang="en-US"/>
               <a:t>Second level</a:t>
             </a:r>
           </a:p>
           <a:p>
             <a:pPr lvl="2"/>
             <a:r>
-              <a:rPr lang="en-US" smtClean="0"/>
+              <a:rPr lang="en-US"/>
               <a:t>Third level</a:t>
             </a:r>
           </a:p>
           <a:p>
             <a:pPr lvl="3"/>
             <a:r>
-              <a:rPr lang="en-US" smtClean="0"/>
+              <a:rPr lang="en-US"/>
               <a:t>Fourth level</a:t>
             </a:r>
           </a:p>
           <a:p>
             <a:pPr lvl="4"/>
             <a:r>
-              <a:rPr lang="en-US" smtClean="0"/>
+              <a:rPr lang="en-US"/>
               <a:t>Fifth level</a:t>
             </a:r>
-            <a:endParaRPr lang="en-US"/>
           </a:p>
         </p:txBody>
       </p:sp>
@@ -1695,7 +1698,7 @@
           <a:p>
             <a:fld id="{78C97017-6FC3-485B-9764-EAC9E56C1D49}" type="datetimeFigureOut">
               <a:rPr lang="en-US" smtClean="0"/>
-              <a:t>10/16/2016</a:t>
+              <a:t>10/31/2018</a:t>
             </a:fld>
             <a:endParaRPr lang="en-US"/>
           </a:p>
@@ -1793,10 +1796,9 @@
           </a:lstStyle>
           <a:p>
             <a:r>
-              <a:rPr lang="en-US" smtClean="0"/>
+              <a:rPr lang="en-US"/>
               <a:t>Click to edit Master title style</a:t>
             </a:r>
-            <a:endParaRPr lang="en-US"/>
           </a:p>
         </p:txBody>
       </p:sp>
@@ -1859,7 +1861,7 @@
           <a:p>
             <a:pPr lvl="0"/>
             <a:r>
-              <a:rPr lang="en-US" smtClean="0"/>
+              <a:rPr lang="en-US"/>
               <a:t>Click to edit Master text styles</a:t>
             </a:r>
           </a:p>
@@ -1915,38 +1917,37 @@
           <a:p>
             <a:pPr lvl="0"/>
             <a:r>
-              <a:rPr lang="en-US" smtClean="0"/>
+              <a:rPr lang="en-US"/>
               <a:t>Click to edit Master text styles</a:t>
             </a:r>
           </a:p>
           <a:p>
             <a:pPr lvl="1"/>
             <a:r>
-              <a:rPr lang="en-US" smtClean="0"/>
+              <a:rPr lang="en-US"/>
               <a:t>Second level</a:t>
             </a:r>
           </a:p>
           <a:p>
             <a:pPr lvl="2"/>
             <a:r>
-              <a:rPr lang="en-US" smtClean="0"/>
+              <a:rPr lang="en-US"/>
               <a:t>Third level</a:t>
             </a:r>
           </a:p>
           <a:p>
             <a:pPr lvl="3"/>
             <a:r>
-              <a:rPr lang="en-US" smtClean="0"/>
+              <a:rPr lang="en-US"/>
               <a:t>Fourth level</a:t>
             </a:r>
           </a:p>
           <a:p>
             <a:pPr lvl="4"/>
             <a:r>
-              <a:rPr lang="en-US" smtClean="0"/>
+              <a:rPr lang="en-US"/>
               <a:t>Fifth level</a:t>
             </a:r>
-            <a:endParaRPr lang="en-US"/>
           </a:p>
         </p:txBody>
       </p:sp>
@@ -2009,7 +2010,7 @@
           <a:p>
             <a:pPr lvl="0"/>
             <a:r>
-              <a:rPr lang="en-US" smtClean="0"/>
+              <a:rPr lang="en-US"/>
               <a:t>Click to edit Master text styles</a:t>
             </a:r>
           </a:p>
@@ -2065,38 +2066,37 @@
           <a:p>
             <a:pPr lvl="0"/>
             <a:r>
-              <a:rPr lang="en-US" smtClean="0"/>
+              <a:rPr lang="en-US"/>
               <a:t>Click to edit Master text styles</a:t>
             </a:r>
           </a:p>
           <a:p>
             <a:pPr lvl="1"/>
             <a:r>
-              <a:rPr lang="en-US" smtClean="0"/>
+              <a:rPr lang="en-US"/>
               <a:t>Second level</a:t>
             </a:r>
           </a:p>
           <a:p>
             <a:pPr lvl="2"/>
             <a:r>
-              <a:rPr lang="en-US" smtClean="0"/>
+              <a:rPr lang="en-US"/>
               <a:t>Third level</a:t>
             </a:r>
           </a:p>
           <a:p>
             <a:pPr lvl="3"/>
             <a:r>
-              <a:rPr lang="en-US" smtClean="0"/>
+              <a:rPr lang="en-US"/>
               <a:t>Fourth level</a:t>
             </a:r>
           </a:p>
           <a:p>
             <a:pPr lvl="4"/>
             <a:r>
-              <a:rPr lang="en-US" smtClean="0"/>
+              <a:rPr lang="en-US"/>
               <a:t>Fifth level</a:t>
             </a:r>
-            <a:endParaRPr lang="en-US"/>
           </a:p>
         </p:txBody>
       </p:sp>
@@ -2117,7 +2117,7 @@
           <a:p>
             <a:fld id="{78C97017-6FC3-485B-9764-EAC9E56C1D49}" type="datetimeFigureOut">
               <a:rPr lang="en-US" smtClean="0"/>
-              <a:t>10/16/2016</a:t>
+              <a:t>10/31/2018</a:t>
             </a:fld>
             <a:endParaRPr lang="en-US"/>
           </a:p>
@@ -2211,10 +2211,9 @@
           <a:lstStyle/>
           <a:p>
             <a:r>
-              <a:rPr lang="en-US" smtClean="0"/>
+              <a:rPr lang="en-US"/>
               <a:t>Click to edit Master title style</a:t>
             </a:r>
-            <a:endParaRPr lang="en-US"/>
           </a:p>
         </p:txBody>
       </p:sp>
@@ -2235,7 +2234,7 @@
           <a:p>
             <a:fld id="{78C97017-6FC3-485B-9764-EAC9E56C1D49}" type="datetimeFigureOut">
               <a:rPr lang="en-US" smtClean="0"/>
-              <a:t>10/16/2016</a:t>
+              <a:t>10/31/2018</a:t>
             </a:fld>
             <a:endParaRPr lang="en-US"/>
           </a:p>
@@ -2330,7 +2329,7 @@
           <a:p>
             <a:fld id="{78C97017-6FC3-485B-9764-EAC9E56C1D49}" type="datetimeFigureOut">
               <a:rPr lang="en-US" smtClean="0"/>
-              <a:t>10/16/2016</a:t>
+              <a:t>10/31/2018</a:t>
             </a:fld>
             <a:endParaRPr lang="en-US"/>
           </a:p>
@@ -2433,10 +2432,9 @@
           </a:lstStyle>
           <a:p>
             <a:r>
-              <a:rPr lang="en-US" smtClean="0"/>
+              <a:rPr lang="en-US"/>
               <a:t>Click to edit Master title style</a:t>
             </a:r>
-            <a:endParaRPr lang="en-US"/>
           </a:p>
         </p:txBody>
       </p:sp>
@@ -2490,38 +2488,37 @@
           <a:p>
             <a:pPr lvl="0"/>
             <a:r>
-              <a:rPr lang="en-US" smtClean="0"/>
+              <a:rPr lang="en-US"/>
               <a:t>Click to edit Master text styles</a:t>
             </a:r>
           </a:p>
           <a:p>
             <a:pPr lvl="1"/>
             <a:r>
-              <a:rPr lang="en-US" smtClean="0"/>
+              <a:rPr lang="en-US"/>
               <a:t>Second level</a:t>
             </a:r>
           </a:p>
           <a:p>
             <a:pPr lvl="2"/>
             <a:r>
-              <a:rPr lang="en-US" smtClean="0"/>
+              <a:rPr lang="en-US"/>
               <a:t>Third level</a:t>
             </a:r>
           </a:p>
           <a:p>
             <a:pPr lvl="3"/>
             <a:r>
-              <a:rPr lang="en-US" smtClean="0"/>
+              <a:rPr lang="en-US"/>
               <a:t>Fourth level</a:t>
             </a:r>
           </a:p>
           <a:p>
             <a:pPr lvl="4"/>
             <a:r>
-              <a:rPr lang="en-US" smtClean="0"/>
+              <a:rPr lang="en-US"/>
               <a:t>Fifth level</a:t>
             </a:r>
-            <a:endParaRPr lang="en-US"/>
           </a:p>
         </p:txBody>
       </p:sp>
@@ -2584,7 +2581,7 @@
           <a:p>
             <a:pPr lvl="0"/>
             <a:r>
-              <a:rPr lang="en-US" smtClean="0"/>
+              <a:rPr lang="en-US"/>
               <a:t>Click to edit Master text styles</a:t>
             </a:r>
           </a:p>
@@ -2607,7 +2604,7 @@
           <a:p>
             <a:fld id="{78C97017-6FC3-485B-9764-EAC9E56C1D49}" type="datetimeFigureOut">
               <a:rPr lang="en-US" smtClean="0"/>
-              <a:t>10/16/2016</a:t>
+              <a:t>10/31/2018</a:t>
             </a:fld>
             <a:endParaRPr lang="en-US"/>
           </a:p>
@@ -2710,10 +2707,9 @@
           </a:lstStyle>
           <a:p>
             <a:r>
-              <a:rPr lang="en-US" smtClean="0"/>
+              <a:rPr lang="en-US"/>
               <a:t>Click to edit Master title style</a:t>
             </a:r>
-            <a:endParaRPr lang="en-US"/>
           </a:p>
         </p:txBody>
       </p:sp>
@@ -2837,7 +2833,7 @@
           <a:p>
             <a:pPr lvl="0"/>
             <a:r>
-              <a:rPr lang="en-US" smtClean="0"/>
+              <a:rPr lang="en-US"/>
               <a:t>Click to edit Master text styles</a:t>
             </a:r>
           </a:p>
@@ -2860,7 +2856,7 @@
           <a:p>
             <a:fld id="{78C97017-6FC3-485B-9764-EAC9E56C1D49}" type="datetimeFigureOut">
               <a:rPr lang="en-US" smtClean="0"/>
-              <a:t>10/16/2016</a:t>
+              <a:t>10/31/2018</a:t>
             </a:fld>
             <a:endParaRPr lang="en-US"/>
           </a:p>
@@ -2969,10 +2965,9 @@
           <a:lstStyle/>
           <a:p>
             <a:r>
-              <a:rPr lang="en-US" smtClean="0"/>
+              <a:rPr lang="en-US"/>
               <a:t>Click to edit Master title style</a:t>
             </a:r>
-            <a:endParaRPr lang="en-US"/>
           </a:p>
         </p:txBody>
       </p:sp>
@@ -3003,38 +2998,37 @@
           <a:p>
             <a:pPr lvl="0"/>
             <a:r>
-              <a:rPr lang="en-US" smtClean="0"/>
+              <a:rPr lang="en-US"/>
               <a:t>Click to edit Master text styles</a:t>
             </a:r>
           </a:p>
           <a:p>
             <a:pPr lvl="1"/>
             <a:r>
-              <a:rPr lang="en-US" smtClean="0"/>
+              <a:rPr lang="en-US"/>
               <a:t>Second level</a:t>
             </a:r>
           </a:p>
           <a:p>
             <a:pPr lvl="2"/>
             <a:r>
-              <a:rPr lang="en-US" smtClean="0"/>
+              <a:rPr lang="en-US"/>
               <a:t>Third level</a:t>
             </a:r>
           </a:p>
           <a:p>
             <a:pPr lvl="3"/>
             <a:r>
-              <a:rPr lang="en-US" smtClean="0"/>
+              <a:rPr lang="en-US"/>
               <a:t>Fourth level</a:t>
             </a:r>
           </a:p>
           <a:p>
             <a:pPr lvl="4"/>
             <a:r>
-              <a:rPr lang="en-US" smtClean="0"/>
+              <a:rPr lang="en-US"/>
               <a:t>Fifth level</a:t>
             </a:r>
-            <a:endParaRPr lang="en-US"/>
           </a:p>
         </p:txBody>
       </p:sp>
@@ -3073,7 +3067,7 @@
           <a:p>
             <a:fld id="{78C97017-6FC3-485B-9764-EAC9E56C1D49}" type="datetimeFigureOut">
               <a:rPr lang="en-US" smtClean="0"/>
-              <a:t>10/16/2016</a:t>
+              <a:t>10/31/2018</a:t>
             </a:fld>
             <a:endParaRPr lang="en-US"/>
           </a:p>
@@ -3546,7 +3540,7 @@
           <a:p>
             <a:pPr algn="ctr"/>
             <a:r>
-              <a:rPr lang="en-US" sz="1600" dirty="0" smtClean="0">
+              <a:rPr lang="en-US" sz="1600" dirty="0">
                 <a:solidFill>
                   <a:schemeClr val="bg1"/>
                 </a:solidFill>
@@ -3605,7 +3599,7 @@
           <a:p>
             <a:pPr algn="ctr"/>
             <a:r>
-              <a:rPr lang="en-US" sz="1600" dirty="0" smtClean="0">
+              <a:rPr lang="en-US" sz="1600" dirty="0">
                 <a:solidFill>
                   <a:schemeClr val="bg1"/>
                 </a:solidFill>
@@ -3668,7 +3662,7 @@
           <a:p>
             <a:pPr algn="ctr"/>
             <a:r>
-              <a:rPr lang="en-US" sz="1600" dirty="0" smtClean="0">
+              <a:rPr lang="en-US" sz="1600" dirty="0">
                 <a:solidFill>
                   <a:schemeClr val="bg1"/>
                 </a:solidFill>
@@ -3727,7 +3721,7 @@
           <a:p>
             <a:pPr algn="ctr"/>
             <a:r>
-              <a:rPr lang="en-US" sz="1600" dirty="0" smtClean="0">
+              <a:rPr lang="en-US" sz="1600" dirty="0">
                 <a:solidFill>
                   <a:schemeClr val="bg1"/>
                 </a:solidFill>
@@ -4176,101 +4170,6 @@
       </p:sp>
       <p:sp>
         <p:nvSpPr>
-          <p:cNvPr id="51" name="Cloud 50"/>
-          <p:cNvSpPr/>
-          <p:nvPr/>
-        </p:nvSpPr>
-        <p:spPr>
-          <a:xfrm>
-            <a:off x="2650069" y="1447800"/>
-            <a:ext cx="914400" cy="533400"/>
-          </a:xfrm>
-          <a:prstGeom prst="cloud">
-            <a:avLst/>
-          </a:prstGeom>
-          <a:solidFill>
-            <a:schemeClr val="bg1"/>
-          </a:solidFill>
-          <a:ln>
-            <a:solidFill>
-              <a:schemeClr val="tx1"/>
-            </a:solidFill>
-          </a:ln>
-        </p:spPr>
-        <p:style>
-          <a:lnRef idx="2">
-            <a:schemeClr val="accent1">
-              <a:shade val="50000"/>
-            </a:schemeClr>
-          </a:lnRef>
-          <a:fillRef idx="1">
-            <a:schemeClr val="accent1"/>
-          </a:fillRef>
-          <a:effectRef idx="0">
-            <a:schemeClr val="accent1"/>
-          </a:effectRef>
-          <a:fontRef idx="minor">
-            <a:schemeClr val="lt1"/>
-          </a:fontRef>
-        </p:style>
-        <p:txBody>
-          <a:bodyPr rtlCol="0" anchor="ctr"/>
-          <a:lstStyle/>
-          <a:p>
-            <a:pPr algn="ctr"/>
-            <a:r>
-              <a:rPr lang="en-US" sz="1400" dirty="0">
-                <a:solidFill>
-                  <a:schemeClr val="tx1"/>
-                </a:solidFill>
-              </a:rPr>
-              <a:t>Web</a:t>
-            </a:r>
-          </a:p>
-        </p:txBody>
-      </p:sp>
-      <p:cxnSp>
-        <p:nvCxnSpPr>
-          <p:cNvPr id="52" name="Elbow Connector 51"/>
-          <p:cNvCxnSpPr>
-            <a:stCxn id="2" idx="0"/>
-            <a:endCxn id="51" idx="2"/>
-          </p:cNvCxnSpPr>
-          <p:nvPr/>
-        </p:nvCxnSpPr>
-        <p:spPr>
-          <a:xfrm rot="5400000" flipH="1" flipV="1">
-            <a:off x="2222648" y="1760922"/>
-            <a:ext cx="476678" cy="383835"/>
-          </a:xfrm>
-          <a:prstGeom prst="bentConnector2">
-            <a:avLst/>
-          </a:prstGeom>
-          <a:ln w="28575">
-            <a:solidFill>
-              <a:srgbClr val="00B050"/>
-            </a:solidFill>
-            <a:prstDash val="sysDot"/>
-            <a:tailEnd type="arrow"/>
-          </a:ln>
-        </p:spPr>
-        <p:style>
-          <a:lnRef idx="1">
-            <a:schemeClr val="accent1"/>
-          </a:lnRef>
-          <a:fillRef idx="0">
-            <a:schemeClr val="accent1"/>
-          </a:fillRef>
-          <a:effectRef idx="0">
-            <a:schemeClr val="accent1"/>
-          </a:effectRef>
-          <a:fontRef idx="minor">
-            <a:schemeClr val="tx1"/>
-          </a:fontRef>
-        </p:style>
-      </p:cxnSp>
-      <p:sp>
-        <p:nvSpPr>
           <p:cNvPr id="23" name="Rectangle 62"/>
           <p:cNvSpPr/>
           <p:nvPr/>
@@ -4313,7 +4212,7 @@
           <a:p>
             <a:pPr algn="ctr"/>
             <a:r>
-              <a:rPr lang="en-US" sz="1600" dirty="0" smtClean="0">
+              <a:rPr lang="en-US" sz="1600" dirty="0">
                 <a:solidFill>
                   <a:schemeClr val="bg1"/>
                 </a:solidFill>
@@ -4664,7 +4563,7 @@
           <a:p>
             <a:pPr algn="ctr"/>
             <a:r>
-              <a:rPr lang="en-US" sz="1600" dirty="0" smtClean="0">
+              <a:rPr lang="en-US" sz="1600" dirty="0">
                 <a:solidFill>
                   <a:schemeClr val="bg1"/>
                 </a:solidFill>
@@ -4672,25 +4571,20 @@
               <a:t>Logs</a:t>
             </a:r>
             <a:br>
-              <a:rPr lang="en-US" sz="1600" dirty="0" smtClean="0">
+              <a:rPr lang="en-US" sz="1600" dirty="0">
                 <a:solidFill>
                   <a:schemeClr val="bg1"/>
                 </a:solidFill>
               </a:rPr>
             </a:br>
             <a:r>
-              <a:rPr lang="en-US" sz="1600" dirty="0" smtClean="0">
+              <a:rPr lang="en-US" sz="1600" dirty="0">
                 <a:solidFill>
                   <a:schemeClr val="bg1"/>
                 </a:solidFill>
               </a:rPr>
               <a:t>Center</a:t>
             </a:r>
-            <a:endParaRPr lang="en-US" sz="1600" dirty="0">
-              <a:solidFill>
-                <a:schemeClr val="bg1"/>
-              </a:solidFill>
-            </a:endParaRPr>
           </a:p>
         </p:txBody>
       </p:sp>

</xml_diff>

<commit_message>
[v1.4] Update documentation diagrams (#133)
* Update diagrams

* Documentation update

* Docs

* Update UserPrefs.java

* Fixes and documentaion

* Update docs/DeveloperGuide.adoc

* Update docs/DeveloperGuide.adoc

* Fix checkstyle

* Update src/test/java/seedu/address/logic/commands/RestoreCommandTest.java

* Fix tests

* Update src/test/java/seedu/address/logic/parser/BackupCommandParserTest.java
</commit_message>
<xml_diff>
--- a/docs/diagrams/ArchitectureDiagram.pptx
+++ b/docs/diagrams/ArchitectureDiagram.pptx
@@ -107,6 +107,22 @@
       </a:defRPr>
     </a:lvl9pPr>
   </p:defaultTextStyle>
+  <p:extLst>
+    <p:ext uri="{EFAFB233-063F-42B5-8137-9DF3F51BA10A}">
+      <p15:sldGuideLst xmlns:p15="http://schemas.microsoft.com/office/powerpoint/2012/main">
+        <p15:guide id="1" orient="horz" pos="1488">
+          <p15:clr>
+            <a:srgbClr val="A4A3A4"/>
+          </p15:clr>
+        </p15:guide>
+        <p15:guide id="2" pos="2880">
+          <p15:clr>
+            <a:srgbClr val="A4A3A4"/>
+          </p15:clr>
+        </p15:guide>
+      </p15:sldGuideLst>
+    </p:ext>
+  </p:extLst>
 </p:presentation>
 </file>
 
@@ -192,7 +208,7 @@
           <a:p>
             <a:fld id="{F5CC4B3F-88C1-4FFA-B1B6-F41C21DC6924}" type="datetimeFigureOut">
               <a:rPr lang="en-US" smtClean="0"/>
-              <a:t>10/16/2016</a:t>
+              <a:t>11/6/2018</a:t>
             </a:fld>
             <a:endParaRPr lang="en-US"/>
           </a:p>
@@ -641,7 +657,7 @@
           <a:p>
             <a:fld id="{78C97017-6FC3-485B-9764-EAC9E56C1D49}" type="datetimeFigureOut">
               <a:rPr lang="en-US" smtClean="0"/>
-              <a:t>10/16/2016</a:t>
+              <a:t>11/6/2018</a:t>
             </a:fld>
             <a:endParaRPr lang="en-US"/>
           </a:p>
@@ -811,7 +827,7 @@
           <a:p>
             <a:fld id="{78C97017-6FC3-485B-9764-EAC9E56C1D49}" type="datetimeFigureOut">
               <a:rPr lang="en-US" smtClean="0"/>
-              <a:t>10/16/2016</a:t>
+              <a:t>11/6/2018</a:t>
             </a:fld>
             <a:endParaRPr lang="en-US"/>
           </a:p>
@@ -991,7 +1007,7 @@
           <a:p>
             <a:fld id="{78C97017-6FC3-485B-9764-EAC9E56C1D49}" type="datetimeFigureOut">
               <a:rPr lang="en-US" smtClean="0"/>
-              <a:t>10/16/2016</a:t>
+              <a:t>11/6/2018</a:t>
             </a:fld>
             <a:endParaRPr lang="en-US"/>
           </a:p>
@@ -1161,7 +1177,7 @@
           <a:p>
             <a:fld id="{78C97017-6FC3-485B-9764-EAC9E56C1D49}" type="datetimeFigureOut">
               <a:rPr lang="en-US" smtClean="0"/>
-              <a:t>10/16/2016</a:t>
+              <a:t>11/6/2018</a:t>
             </a:fld>
             <a:endParaRPr lang="en-US"/>
           </a:p>
@@ -1407,7 +1423,7 @@
           <a:p>
             <a:fld id="{78C97017-6FC3-485B-9764-EAC9E56C1D49}" type="datetimeFigureOut">
               <a:rPr lang="en-US" smtClean="0"/>
-              <a:t>10/16/2016</a:t>
+              <a:t>11/6/2018</a:t>
             </a:fld>
             <a:endParaRPr lang="en-US"/>
           </a:p>
@@ -1695,7 +1711,7 @@
           <a:p>
             <a:fld id="{78C97017-6FC3-485B-9764-EAC9E56C1D49}" type="datetimeFigureOut">
               <a:rPr lang="en-US" smtClean="0"/>
-              <a:t>10/16/2016</a:t>
+              <a:t>11/6/2018</a:t>
             </a:fld>
             <a:endParaRPr lang="en-US"/>
           </a:p>
@@ -2117,7 +2133,7 @@
           <a:p>
             <a:fld id="{78C97017-6FC3-485B-9764-EAC9E56C1D49}" type="datetimeFigureOut">
               <a:rPr lang="en-US" smtClean="0"/>
-              <a:t>10/16/2016</a:t>
+              <a:t>11/6/2018</a:t>
             </a:fld>
             <a:endParaRPr lang="en-US"/>
           </a:p>
@@ -2235,7 +2251,7 @@
           <a:p>
             <a:fld id="{78C97017-6FC3-485B-9764-EAC9E56C1D49}" type="datetimeFigureOut">
               <a:rPr lang="en-US" smtClean="0"/>
-              <a:t>10/16/2016</a:t>
+              <a:t>11/6/2018</a:t>
             </a:fld>
             <a:endParaRPr lang="en-US"/>
           </a:p>
@@ -2330,7 +2346,7 @@
           <a:p>
             <a:fld id="{78C97017-6FC3-485B-9764-EAC9E56C1D49}" type="datetimeFigureOut">
               <a:rPr lang="en-US" smtClean="0"/>
-              <a:t>10/16/2016</a:t>
+              <a:t>11/6/2018</a:t>
             </a:fld>
             <a:endParaRPr lang="en-US"/>
           </a:p>
@@ -2607,7 +2623,7 @@
           <a:p>
             <a:fld id="{78C97017-6FC3-485B-9764-EAC9E56C1D49}" type="datetimeFigureOut">
               <a:rPr lang="en-US" smtClean="0"/>
-              <a:t>10/16/2016</a:t>
+              <a:t>11/6/2018</a:t>
             </a:fld>
             <a:endParaRPr lang="en-US"/>
           </a:p>
@@ -2860,7 +2876,7 @@
           <a:p>
             <a:fld id="{78C97017-6FC3-485B-9764-EAC9E56C1D49}" type="datetimeFigureOut">
               <a:rPr lang="en-US" smtClean="0"/>
-              <a:t>10/16/2016</a:t>
+              <a:t>11/6/2018</a:t>
             </a:fld>
             <a:endParaRPr lang="en-US"/>
           </a:p>
@@ -3073,7 +3089,7 @@
           <a:p>
             <a:fld id="{78C97017-6FC3-485B-9764-EAC9E56C1D49}" type="datetimeFigureOut">
               <a:rPr lang="en-US" smtClean="0"/>
-              <a:t>10/16/2016</a:t>
+              <a:t>11/6/2018</a:t>
             </a:fld>
             <a:endParaRPr lang="en-US"/>
           </a:p>
@@ -4756,6 +4772,105 @@
                 <a:lumMod val="75000"/>
               </a:schemeClr>
             </a:solidFill>
+          </a:ln>
+        </p:spPr>
+        <p:style>
+          <a:lnRef idx="1">
+            <a:schemeClr val="accent1"/>
+          </a:lnRef>
+          <a:fillRef idx="0">
+            <a:schemeClr val="accent1"/>
+          </a:fillRef>
+          <a:effectRef idx="0">
+            <a:schemeClr val="accent1"/>
+          </a:effectRef>
+          <a:fontRef idx="minor">
+            <a:schemeClr val="tx1"/>
+          </a:fontRef>
+        </p:style>
+      </p:cxnSp>
+      <p:sp>
+        <p:nvSpPr>
+          <p:cNvPr id="42" name="Cloud 41"/>
+          <p:cNvSpPr/>
+          <p:nvPr/>
+        </p:nvSpPr>
+        <p:spPr>
+          <a:xfrm>
+            <a:off x="6251332" y="1469732"/>
+            <a:ext cx="987668" cy="555331"/>
+          </a:xfrm>
+          <a:prstGeom prst="cloud">
+            <a:avLst/>
+          </a:prstGeom>
+          <a:solidFill>
+            <a:schemeClr val="bg1"/>
+          </a:solidFill>
+          <a:ln>
+            <a:solidFill>
+              <a:schemeClr val="tx1"/>
+            </a:solidFill>
+          </a:ln>
+        </p:spPr>
+        <p:style>
+          <a:lnRef idx="2">
+            <a:schemeClr val="accent1">
+              <a:shade val="50000"/>
+            </a:schemeClr>
+          </a:lnRef>
+          <a:fillRef idx="1">
+            <a:schemeClr val="accent1"/>
+          </a:fillRef>
+          <a:effectRef idx="0">
+            <a:schemeClr val="accent1"/>
+          </a:effectRef>
+          <a:fontRef idx="minor">
+            <a:schemeClr val="lt1"/>
+          </a:fontRef>
+        </p:style>
+        <p:txBody>
+          <a:bodyPr rtlCol="0" anchor="ctr"/>
+          <a:lstStyle/>
+          <a:p>
+            <a:pPr algn="ctr"/>
+            <a:r>
+              <a:rPr lang="en-US" sz="1400" dirty="0" smtClean="0">
+                <a:solidFill>
+                  <a:schemeClr val="tx1"/>
+                </a:solidFill>
+              </a:rPr>
+              <a:t>Cloud</a:t>
+            </a:r>
+            <a:endParaRPr lang="en-US" sz="1400" dirty="0">
+              <a:solidFill>
+                <a:schemeClr val="tx1"/>
+              </a:solidFill>
+            </a:endParaRPr>
+          </a:p>
+        </p:txBody>
+      </p:sp>
+      <p:cxnSp>
+        <p:nvCxnSpPr>
+          <p:cNvPr id="43" name="Elbow Connector 42"/>
+          <p:cNvCxnSpPr>
+            <a:endCxn id="42" idx="2"/>
+          </p:cNvCxnSpPr>
+          <p:nvPr/>
+        </p:nvCxnSpPr>
+        <p:spPr>
+          <a:xfrm rot="5400000" flipH="1" flipV="1">
+            <a:off x="5829507" y="1788223"/>
+            <a:ext cx="465714" cy="384064"/>
+          </a:xfrm>
+          <a:prstGeom prst="bentConnector2">
+            <a:avLst/>
+          </a:prstGeom>
+          <a:ln w="28575">
+            <a:solidFill>
+              <a:srgbClr val="E46C0A"/>
+            </a:solidFill>
+            <a:prstDash val="sysDot"/>
+            <a:tailEnd type="arrow"/>
           </a:ln>
         </p:spPr>
         <p:style>

</xml_diff>

<commit_message>
Modify the architecture diagram, and add a new sequence diagram to illustrate the MVC implementation
</commit_message>
<xml_diff>
--- a/docs/diagrams/ArchitectureDiagram.pptx
+++ b/docs/diagrams/ArchitectureDiagram.pptx
@@ -107,6 +107,22 @@
       </a:defRPr>
     </a:lvl9pPr>
   </p:defaultTextStyle>
+  <p:extLst>
+    <p:ext uri="{EFAFB233-063F-42B5-8137-9DF3F51BA10A}">
+      <p15:sldGuideLst xmlns:p15="http://schemas.microsoft.com/office/powerpoint/2012/main">
+        <p15:guide id="1" orient="horz" pos="1488">
+          <p15:clr>
+            <a:srgbClr val="A4A3A4"/>
+          </p15:clr>
+        </p15:guide>
+        <p15:guide id="2" pos="2880">
+          <p15:clr>
+            <a:srgbClr val="A4A3A4"/>
+          </p15:clr>
+        </p15:guide>
+      </p15:sldGuideLst>
+    </p:ext>
+  </p:extLst>
 </p:presentation>
 </file>
 
@@ -192,7 +208,7 @@
           <a:p>
             <a:fld id="{F5CC4B3F-88C1-4FFA-B1B6-F41C21DC6924}" type="datetimeFigureOut">
               <a:rPr lang="en-US" smtClean="0"/>
-              <a:t>10/16/2016</a:t>
+              <a:t>9/11/2018</a:t>
             </a:fld>
             <a:endParaRPr lang="en-US"/>
           </a:p>
@@ -256,38 +272,37 @@
           <a:p>
             <a:pPr lvl="0"/>
             <a:r>
-              <a:rPr lang="en-US" smtClean="0"/>
+              <a:rPr lang="en-US"/>
               <a:t>Click to edit Master text styles</a:t>
             </a:r>
           </a:p>
           <a:p>
             <a:pPr lvl="1"/>
             <a:r>
-              <a:rPr lang="en-US" smtClean="0"/>
+              <a:rPr lang="en-US"/>
               <a:t>Second level</a:t>
             </a:r>
           </a:p>
           <a:p>
             <a:pPr lvl="2"/>
             <a:r>
-              <a:rPr lang="en-US" smtClean="0"/>
+              <a:rPr lang="en-US"/>
               <a:t>Third level</a:t>
             </a:r>
           </a:p>
           <a:p>
             <a:pPr lvl="3"/>
             <a:r>
-              <a:rPr lang="en-US" smtClean="0"/>
+              <a:rPr lang="en-US"/>
               <a:t>Fourth level</a:t>
             </a:r>
           </a:p>
           <a:p>
             <a:pPr lvl="4"/>
             <a:r>
-              <a:rPr lang="en-US" smtClean="0"/>
+              <a:rPr lang="en-US"/>
               <a:t>Fifth level</a:t>
             </a:r>
-            <a:endParaRPr lang="en-US"/>
           </a:p>
         </p:txBody>
       </p:sp>
@@ -498,10 +513,9 @@
           <a:lstStyle/>
           <a:p>
             <a:r>
-              <a:rPr lang="en-US" smtClean="0"/>
+              <a:rPr lang="en-US"/>
               <a:t>Click to edit Master title style</a:t>
             </a:r>
-            <a:endParaRPr lang="en-US"/>
           </a:p>
         </p:txBody>
       </p:sp>
@@ -617,10 +631,9 @@
           </a:lstStyle>
           <a:p>
             <a:r>
-              <a:rPr lang="en-US" smtClean="0"/>
+              <a:rPr lang="en-US"/>
               <a:t>Click to edit Master subtitle style</a:t>
             </a:r>
-            <a:endParaRPr lang="en-US"/>
           </a:p>
         </p:txBody>
       </p:sp>
@@ -641,7 +654,7 @@
           <a:p>
             <a:fld id="{78C97017-6FC3-485B-9764-EAC9E56C1D49}" type="datetimeFigureOut">
               <a:rPr lang="en-US" smtClean="0"/>
-              <a:t>10/16/2016</a:t>
+              <a:t>9/11/2018</a:t>
             </a:fld>
             <a:endParaRPr lang="en-US"/>
           </a:p>
@@ -735,10 +748,9 @@
           <a:lstStyle/>
           <a:p>
             <a:r>
-              <a:rPr lang="en-US" smtClean="0"/>
+              <a:rPr lang="en-US"/>
               <a:t>Click to edit Master title style</a:t>
             </a:r>
-            <a:endParaRPr lang="en-US"/>
           </a:p>
         </p:txBody>
       </p:sp>
@@ -759,38 +771,37 @@
           <a:p>
             <a:pPr lvl="0"/>
             <a:r>
-              <a:rPr lang="en-US" smtClean="0"/>
+              <a:rPr lang="en-US"/>
               <a:t>Click to edit Master text styles</a:t>
             </a:r>
           </a:p>
           <a:p>
             <a:pPr lvl="1"/>
             <a:r>
-              <a:rPr lang="en-US" smtClean="0"/>
+              <a:rPr lang="en-US"/>
               <a:t>Second level</a:t>
             </a:r>
           </a:p>
           <a:p>
             <a:pPr lvl="2"/>
             <a:r>
-              <a:rPr lang="en-US" smtClean="0"/>
+              <a:rPr lang="en-US"/>
               <a:t>Third level</a:t>
             </a:r>
           </a:p>
           <a:p>
             <a:pPr lvl="3"/>
             <a:r>
-              <a:rPr lang="en-US" smtClean="0"/>
+              <a:rPr lang="en-US"/>
               <a:t>Fourth level</a:t>
             </a:r>
           </a:p>
           <a:p>
             <a:pPr lvl="4"/>
             <a:r>
-              <a:rPr lang="en-US" smtClean="0"/>
+              <a:rPr lang="en-US"/>
               <a:t>Fifth level</a:t>
             </a:r>
-            <a:endParaRPr lang="en-US"/>
           </a:p>
         </p:txBody>
       </p:sp>
@@ -811,7 +822,7 @@
           <a:p>
             <a:fld id="{78C97017-6FC3-485B-9764-EAC9E56C1D49}" type="datetimeFigureOut">
               <a:rPr lang="en-US" smtClean="0"/>
-              <a:t>10/16/2016</a:t>
+              <a:t>9/11/2018</a:t>
             </a:fld>
             <a:endParaRPr lang="en-US"/>
           </a:p>
@@ -910,10 +921,9 @@
           <a:lstStyle/>
           <a:p>
             <a:r>
-              <a:rPr lang="en-US" smtClean="0"/>
+              <a:rPr lang="en-US"/>
               <a:t>Click to edit Master title style</a:t>
             </a:r>
-            <a:endParaRPr lang="en-US"/>
           </a:p>
         </p:txBody>
       </p:sp>
@@ -939,38 +949,37 @@
           <a:p>
             <a:pPr lvl="0"/>
             <a:r>
-              <a:rPr lang="en-US" smtClean="0"/>
+              <a:rPr lang="en-US"/>
               <a:t>Click to edit Master text styles</a:t>
             </a:r>
           </a:p>
           <a:p>
             <a:pPr lvl="1"/>
             <a:r>
-              <a:rPr lang="en-US" smtClean="0"/>
+              <a:rPr lang="en-US"/>
               <a:t>Second level</a:t>
             </a:r>
           </a:p>
           <a:p>
             <a:pPr lvl="2"/>
             <a:r>
-              <a:rPr lang="en-US" smtClean="0"/>
+              <a:rPr lang="en-US"/>
               <a:t>Third level</a:t>
             </a:r>
           </a:p>
           <a:p>
             <a:pPr lvl="3"/>
             <a:r>
-              <a:rPr lang="en-US" smtClean="0"/>
+              <a:rPr lang="en-US"/>
               <a:t>Fourth level</a:t>
             </a:r>
           </a:p>
           <a:p>
             <a:pPr lvl="4"/>
             <a:r>
-              <a:rPr lang="en-US" smtClean="0"/>
+              <a:rPr lang="en-US"/>
               <a:t>Fifth level</a:t>
             </a:r>
-            <a:endParaRPr lang="en-US"/>
           </a:p>
         </p:txBody>
       </p:sp>
@@ -991,7 +1000,7 @@
           <a:p>
             <a:fld id="{78C97017-6FC3-485B-9764-EAC9E56C1D49}" type="datetimeFigureOut">
               <a:rPr lang="en-US" smtClean="0"/>
-              <a:t>10/16/2016</a:t>
+              <a:t>9/11/2018</a:t>
             </a:fld>
             <a:endParaRPr lang="en-US"/>
           </a:p>
@@ -1085,10 +1094,9 @@
           <a:lstStyle/>
           <a:p>
             <a:r>
-              <a:rPr lang="en-US" smtClean="0"/>
+              <a:rPr lang="en-US"/>
               <a:t>Click to edit Master title style</a:t>
             </a:r>
-            <a:endParaRPr lang="en-US"/>
           </a:p>
         </p:txBody>
       </p:sp>
@@ -1109,38 +1117,37 @@
           <a:p>
             <a:pPr lvl="0"/>
             <a:r>
-              <a:rPr lang="en-US" smtClean="0"/>
+              <a:rPr lang="en-US"/>
               <a:t>Click to edit Master text styles</a:t>
             </a:r>
           </a:p>
           <a:p>
             <a:pPr lvl="1"/>
             <a:r>
-              <a:rPr lang="en-US" smtClean="0"/>
+              <a:rPr lang="en-US"/>
               <a:t>Second level</a:t>
             </a:r>
           </a:p>
           <a:p>
             <a:pPr lvl="2"/>
             <a:r>
-              <a:rPr lang="en-US" smtClean="0"/>
+              <a:rPr lang="en-US"/>
               <a:t>Third level</a:t>
             </a:r>
           </a:p>
           <a:p>
             <a:pPr lvl="3"/>
             <a:r>
-              <a:rPr lang="en-US" smtClean="0"/>
+              <a:rPr lang="en-US"/>
               <a:t>Fourth level</a:t>
             </a:r>
           </a:p>
           <a:p>
             <a:pPr lvl="4"/>
             <a:r>
-              <a:rPr lang="en-US" smtClean="0"/>
+              <a:rPr lang="en-US"/>
               <a:t>Fifth level</a:t>
             </a:r>
-            <a:endParaRPr lang="en-US"/>
           </a:p>
         </p:txBody>
       </p:sp>
@@ -1161,7 +1168,7 @@
           <a:p>
             <a:fld id="{78C97017-6FC3-485B-9764-EAC9E56C1D49}" type="datetimeFigureOut">
               <a:rPr lang="en-US" smtClean="0"/>
-              <a:t>10/16/2016</a:t>
+              <a:t>9/11/2018</a:t>
             </a:fld>
             <a:endParaRPr lang="en-US"/>
           </a:p>
@@ -1264,10 +1271,9 @@
           </a:lstStyle>
           <a:p>
             <a:r>
-              <a:rPr lang="en-US" smtClean="0"/>
+              <a:rPr lang="en-US"/>
               <a:t>Click to edit Master title style</a:t>
             </a:r>
-            <a:endParaRPr lang="en-US"/>
           </a:p>
         </p:txBody>
       </p:sp>
@@ -1384,7 +1390,7 @@
           <a:p>
             <a:pPr lvl="0"/>
             <a:r>
-              <a:rPr lang="en-US" smtClean="0"/>
+              <a:rPr lang="en-US"/>
               <a:t>Click to edit Master text styles</a:t>
             </a:r>
           </a:p>
@@ -1407,7 +1413,7 @@
           <a:p>
             <a:fld id="{78C97017-6FC3-485B-9764-EAC9E56C1D49}" type="datetimeFigureOut">
               <a:rPr lang="en-US" smtClean="0"/>
-              <a:t>10/16/2016</a:t>
+              <a:t>9/11/2018</a:t>
             </a:fld>
             <a:endParaRPr lang="en-US"/>
           </a:p>
@@ -1501,10 +1507,9 @@
           <a:lstStyle/>
           <a:p>
             <a:r>
-              <a:rPr lang="en-US" smtClean="0"/>
+              <a:rPr lang="en-US"/>
               <a:t>Click to edit Master title style</a:t>
             </a:r>
-            <a:endParaRPr lang="en-US"/>
           </a:p>
         </p:txBody>
       </p:sp>
@@ -1558,38 +1563,37 @@
           <a:p>
             <a:pPr lvl="0"/>
             <a:r>
-              <a:rPr lang="en-US" smtClean="0"/>
+              <a:rPr lang="en-US"/>
               <a:t>Click to edit Master text styles</a:t>
             </a:r>
           </a:p>
           <a:p>
             <a:pPr lvl="1"/>
             <a:r>
-              <a:rPr lang="en-US" smtClean="0"/>
+              <a:rPr lang="en-US"/>
               <a:t>Second level</a:t>
             </a:r>
           </a:p>
           <a:p>
             <a:pPr lvl="2"/>
             <a:r>
-              <a:rPr lang="en-US" smtClean="0"/>
+              <a:rPr lang="en-US"/>
               <a:t>Third level</a:t>
             </a:r>
           </a:p>
           <a:p>
             <a:pPr lvl="3"/>
             <a:r>
-              <a:rPr lang="en-US" smtClean="0"/>
+              <a:rPr lang="en-US"/>
               <a:t>Fourth level</a:t>
             </a:r>
           </a:p>
           <a:p>
             <a:pPr lvl="4"/>
             <a:r>
-              <a:rPr lang="en-US" smtClean="0"/>
+              <a:rPr lang="en-US"/>
               <a:t>Fifth level</a:t>
             </a:r>
-            <a:endParaRPr lang="en-US"/>
           </a:p>
         </p:txBody>
       </p:sp>
@@ -1643,38 +1647,37 @@
           <a:p>
             <a:pPr lvl="0"/>
             <a:r>
-              <a:rPr lang="en-US" smtClean="0"/>
+              <a:rPr lang="en-US"/>
               <a:t>Click to edit Master text styles</a:t>
             </a:r>
           </a:p>
           <a:p>
             <a:pPr lvl="1"/>
             <a:r>
-              <a:rPr lang="en-US" smtClean="0"/>
+              <a:rPr lang="en-US"/>
               <a:t>Second level</a:t>
             </a:r>
           </a:p>
           <a:p>
             <a:pPr lvl="2"/>
             <a:r>
-              <a:rPr lang="en-US" smtClean="0"/>
+              <a:rPr lang="en-US"/>
               <a:t>Third level</a:t>
             </a:r>
           </a:p>
           <a:p>
             <a:pPr lvl="3"/>
             <a:r>
-              <a:rPr lang="en-US" smtClean="0"/>
+              <a:rPr lang="en-US"/>
               <a:t>Fourth level</a:t>
             </a:r>
           </a:p>
           <a:p>
             <a:pPr lvl="4"/>
             <a:r>
-              <a:rPr lang="en-US" smtClean="0"/>
+              <a:rPr lang="en-US"/>
               <a:t>Fifth level</a:t>
             </a:r>
-            <a:endParaRPr lang="en-US"/>
           </a:p>
         </p:txBody>
       </p:sp>
@@ -1695,7 +1698,7 @@
           <a:p>
             <a:fld id="{78C97017-6FC3-485B-9764-EAC9E56C1D49}" type="datetimeFigureOut">
               <a:rPr lang="en-US" smtClean="0"/>
-              <a:t>10/16/2016</a:t>
+              <a:t>9/11/2018</a:t>
             </a:fld>
             <a:endParaRPr lang="en-US"/>
           </a:p>
@@ -1793,10 +1796,9 @@
           </a:lstStyle>
           <a:p>
             <a:r>
-              <a:rPr lang="en-US" smtClean="0"/>
+              <a:rPr lang="en-US"/>
               <a:t>Click to edit Master title style</a:t>
             </a:r>
-            <a:endParaRPr lang="en-US"/>
           </a:p>
         </p:txBody>
       </p:sp>
@@ -1859,7 +1861,7 @@
           <a:p>
             <a:pPr lvl="0"/>
             <a:r>
-              <a:rPr lang="en-US" smtClean="0"/>
+              <a:rPr lang="en-US"/>
               <a:t>Click to edit Master text styles</a:t>
             </a:r>
           </a:p>
@@ -1915,38 +1917,37 @@
           <a:p>
             <a:pPr lvl="0"/>
             <a:r>
-              <a:rPr lang="en-US" smtClean="0"/>
+              <a:rPr lang="en-US"/>
               <a:t>Click to edit Master text styles</a:t>
             </a:r>
           </a:p>
           <a:p>
             <a:pPr lvl="1"/>
             <a:r>
-              <a:rPr lang="en-US" smtClean="0"/>
+              <a:rPr lang="en-US"/>
               <a:t>Second level</a:t>
             </a:r>
           </a:p>
           <a:p>
             <a:pPr lvl="2"/>
             <a:r>
-              <a:rPr lang="en-US" smtClean="0"/>
+              <a:rPr lang="en-US"/>
               <a:t>Third level</a:t>
             </a:r>
           </a:p>
           <a:p>
             <a:pPr lvl="3"/>
             <a:r>
-              <a:rPr lang="en-US" smtClean="0"/>
+              <a:rPr lang="en-US"/>
               <a:t>Fourth level</a:t>
             </a:r>
           </a:p>
           <a:p>
             <a:pPr lvl="4"/>
             <a:r>
-              <a:rPr lang="en-US" smtClean="0"/>
+              <a:rPr lang="en-US"/>
               <a:t>Fifth level</a:t>
             </a:r>
-            <a:endParaRPr lang="en-US"/>
           </a:p>
         </p:txBody>
       </p:sp>
@@ -2009,7 +2010,7 @@
           <a:p>
             <a:pPr lvl="0"/>
             <a:r>
-              <a:rPr lang="en-US" smtClean="0"/>
+              <a:rPr lang="en-US"/>
               <a:t>Click to edit Master text styles</a:t>
             </a:r>
           </a:p>
@@ -2065,38 +2066,37 @@
           <a:p>
             <a:pPr lvl="0"/>
             <a:r>
-              <a:rPr lang="en-US" smtClean="0"/>
+              <a:rPr lang="en-US"/>
               <a:t>Click to edit Master text styles</a:t>
             </a:r>
           </a:p>
           <a:p>
             <a:pPr lvl="1"/>
             <a:r>
-              <a:rPr lang="en-US" smtClean="0"/>
+              <a:rPr lang="en-US"/>
               <a:t>Second level</a:t>
             </a:r>
           </a:p>
           <a:p>
             <a:pPr lvl="2"/>
             <a:r>
-              <a:rPr lang="en-US" smtClean="0"/>
+              <a:rPr lang="en-US"/>
               <a:t>Third level</a:t>
             </a:r>
           </a:p>
           <a:p>
             <a:pPr lvl="3"/>
             <a:r>
-              <a:rPr lang="en-US" smtClean="0"/>
+              <a:rPr lang="en-US"/>
               <a:t>Fourth level</a:t>
             </a:r>
           </a:p>
           <a:p>
             <a:pPr lvl="4"/>
             <a:r>
-              <a:rPr lang="en-US" smtClean="0"/>
+              <a:rPr lang="en-US"/>
               <a:t>Fifth level</a:t>
             </a:r>
-            <a:endParaRPr lang="en-US"/>
           </a:p>
         </p:txBody>
       </p:sp>
@@ -2117,7 +2117,7 @@
           <a:p>
             <a:fld id="{78C97017-6FC3-485B-9764-EAC9E56C1D49}" type="datetimeFigureOut">
               <a:rPr lang="en-US" smtClean="0"/>
-              <a:t>10/16/2016</a:t>
+              <a:t>9/11/2018</a:t>
             </a:fld>
             <a:endParaRPr lang="en-US"/>
           </a:p>
@@ -2211,10 +2211,9 @@
           <a:lstStyle/>
           <a:p>
             <a:r>
-              <a:rPr lang="en-US" smtClean="0"/>
+              <a:rPr lang="en-US"/>
               <a:t>Click to edit Master title style</a:t>
             </a:r>
-            <a:endParaRPr lang="en-US"/>
           </a:p>
         </p:txBody>
       </p:sp>
@@ -2235,7 +2234,7 @@
           <a:p>
             <a:fld id="{78C97017-6FC3-485B-9764-EAC9E56C1D49}" type="datetimeFigureOut">
               <a:rPr lang="en-US" smtClean="0"/>
-              <a:t>10/16/2016</a:t>
+              <a:t>9/11/2018</a:t>
             </a:fld>
             <a:endParaRPr lang="en-US"/>
           </a:p>
@@ -2330,7 +2329,7 @@
           <a:p>
             <a:fld id="{78C97017-6FC3-485B-9764-EAC9E56C1D49}" type="datetimeFigureOut">
               <a:rPr lang="en-US" smtClean="0"/>
-              <a:t>10/16/2016</a:t>
+              <a:t>9/11/2018</a:t>
             </a:fld>
             <a:endParaRPr lang="en-US"/>
           </a:p>
@@ -2433,10 +2432,9 @@
           </a:lstStyle>
           <a:p>
             <a:r>
-              <a:rPr lang="en-US" smtClean="0"/>
+              <a:rPr lang="en-US"/>
               <a:t>Click to edit Master title style</a:t>
             </a:r>
-            <a:endParaRPr lang="en-US"/>
           </a:p>
         </p:txBody>
       </p:sp>
@@ -2490,38 +2488,37 @@
           <a:p>
             <a:pPr lvl="0"/>
             <a:r>
-              <a:rPr lang="en-US" smtClean="0"/>
+              <a:rPr lang="en-US"/>
               <a:t>Click to edit Master text styles</a:t>
             </a:r>
           </a:p>
           <a:p>
             <a:pPr lvl="1"/>
             <a:r>
-              <a:rPr lang="en-US" smtClean="0"/>
+              <a:rPr lang="en-US"/>
               <a:t>Second level</a:t>
             </a:r>
           </a:p>
           <a:p>
             <a:pPr lvl="2"/>
             <a:r>
-              <a:rPr lang="en-US" smtClean="0"/>
+              <a:rPr lang="en-US"/>
               <a:t>Third level</a:t>
             </a:r>
           </a:p>
           <a:p>
             <a:pPr lvl="3"/>
             <a:r>
-              <a:rPr lang="en-US" smtClean="0"/>
+              <a:rPr lang="en-US"/>
               <a:t>Fourth level</a:t>
             </a:r>
           </a:p>
           <a:p>
             <a:pPr lvl="4"/>
             <a:r>
-              <a:rPr lang="en-US" smtClean="0"/>
+              <a:rPr lang="en-US"/>
               <a:t>Fifth level</a:t>
             </a:r>
-            <a:endParaRPr lang="en-US"/>
           </a:p>
         </p:txBody>
       </p:sp>
@@ -2584,7 +2581,7 @@
           <a:p>
             <a:pPr lvl="0"/>
             <a:r>
-              <a:rPr lang="en-US" smtClean="0"/>
+              <a:rPr lang="en-US"/>
               <a:t>Click to edit Master text styles</a:t>
             </a:r>
           </a:p>
@@ -2607,7 +2604,7 @@
           <a:p>
             <a:fld id="{78C97017-6FC3-485B-9764-EAC9E56C1D49}" type="datetimeFigureOut">
               <a:rPr lang="en-US" smtClean="0"/>
-              <a:t>10/16/2016</a:t>
+              <a:t>9/11/2018</a:t>
             </a:fld>
             <a:endParaRPr lang="en-US"/>
           </a:p>
@@ -2710,10 +2707,9 @@
           </a:lstStyle>
           <a:p>
             <a:r>
-              <a:rPr lang="en-US" smtClean="0"/>
+              <a:rPr lang="en-US"/>
               <a:t>Click to edit Master title style</a:t>
             </a:r>
-            <a:endParaRPr lang="en-US"/>
           </a:p>
         </p:txBody>
       </p:sp>
@@ -2837,7 +2833,7 @@
           <a:p>
             <a:pPr lvl="0"/>
             <a:r>
-              <a:rPr lang="en-US" smtClean="0"/>
+              <a:rPr lang="en-US"/>
               <a:t>Click to edit Master text styles</a:t>
             </a:r>
           </a:p>
@@ -2860,7 +2856,7 @@
           <a:p>
             <a:fld id="{78C97017-6FC3-485B-9764-EAC9E56C1D49}" type="datetimeFigureOut">
               <a:rPr lang="en-US" smtClean="0"/>
-              <a:t>10/16/2016</a:t>
+              <a:t>9/11/2018</a:t>
             </a:fld>
             <a:endParaRPr lang="en-US"/>
           </a:p>
@@ -2969,10 +2965,9 @@
           <a:lstStyle/>
           <a:p>
             <a:r>
-              <a:rPr lang="en-US" smtClean="0"/>
+              <a:rPr lang="en-US"/>
               <a:t>Click to edit Master title style</a:t>
             </a:r>
-            <a:endParaRPr lang="en-US"/>
           </a:p>
         </p:txBody>
       </p:sp>
@@ -3003,38 +2998,37 @@
           <a:p>
             <a:pPr lvl="0"/>
             <a:r>
-              <a:rPr lang="en-US" smtClean="0"/>
+              <a:rPr lang="en-US"/>
               <a:t>Click to edit Master text styles</a:t>
             </a:r>
           </a:p>
           <a:p>
             <a:pPr lvl="1"/>
             <a:r>
-              <a:rPr lang="en-US" smtClean="0"/>
+              <a:rPr lang="en-US"/>
               <a:t>Second level</a:t>
             </a:r>
           </a:p>
           <a:p>
             <a:pPr lvl="2"/>
             <a:r>
-              <a:rPr lang="en-US" smtClean="0"/>
+              <a:rPr lang="en-US"/>
               <a:t>Third level</a:t>
             </a:r>
           </a:p>
           <a:p>
             <a:pPr lvl="3"/>
             <a:r>
-              <a:rPr lang="en-US" smtClean="0"/>
+              <a:rPr lang="en-US"/>
               <a:t>Fourth level</a:t>
             </a:r>
           </a:p>
           <a:p>
             <a:pPr lvl="4"/>
             <a:r>
-              <a:rPr lang="en-US" smtClean="0"/>
+              <a:rPr lang="en-US"/>
               <a:t>Fifth level</a:t>
             </a:r>
-            <a:endParaRPr lang="en-US"/>
           </a:p>
         </p:txBody>
       </p:sp>
@@ -3073,7 +3067,7 @@
           <a:p>
             <a:fld id="{78C97017-6FC3-485B-9764-EAC9E56C1D49}" type="datetimeFigureOut">
               <a:rPr lang="en-US" smtClean="0"/>
-              <a:t>10/16/2016</a:t>
+              <a:t>9/11/2018</a:t>
             </a:fld>
             <a:endParaRPr lang="en-US"/>
           </a:p>
@@ -3546,7 +3540,7 @@
           <a:p>
             <a:pPr algn="ctr"/>
             <a:r>
-              <a:rPr lang="en-US" sz="1600" dirty="0" smtClean="0">
+              <a:rPr lang="en-US" sz="1600" dirty="0">
                 <a:solidFill>
                   <a:schemeClr val="bg1"/>
                 </a:solidFill>
@@ -3605,7 +3599,7 @@
           <a:p>
             <a:pPr algn="ctr"/>
             <a:r>
-              <a:rPr lang="en-US" sz="1600" dirty="0" smtClean="0">
+              <a:rPr lang="en-US" sz="1600" dirty="0">
                 <a:solidFill>
                   <a:schemeClr val="bg1"/>
                 </a:solidFill>
@@ -3668,7 +3662,7 @@
           <a:p>
             <a:pPr algn="ctr"/>
             <a:r>
-              <a:rPr lang="en-US" sz="1600" dirty="0" smtClean="0">
+              <a:rPr lang="en-US" sz="1600" dirty="0">
                 <a:solidFill>
                   <a:schemeClr val="bg1"/>
                 </a:solidFill>
@@ -3727,7 +3721,7 @@
           <a:p>
             <a:pPr algn="ctr"/>
             <a:r>
-              <a:rPr lang="en-US" sz="1600" dirty="0" smtClean="0">
+              <a:rPr lang="en-US" sz="1600" dirty="0">
                 <a:solidFill>
                   <a:schemeClr val="bg1"/>
                 </a:solidFill>
@@ -4176,101 +4170,6 @@
       </p:sp>
       <p:sp>
         <p:nvSpPr>
-          <p:cNvPr id="51" name="Cloud 50"/>
-          <p:cNvSpPr/>
-          <p:nvPr/>
-        </p:nvSpPr>
-        <p:spPr>
-          <a:xfrm>
-            <a:off x="2650069" y="1447800"/>
-            <a:ext cx="914400" cy="533400"/>
-          </a:xfrm>
-          <a:prstGeom prst="cloud">
-            <a:avLst/>
-          </a:prstGeom>
-          <a:solidFill>
-            <a:schemeClr val="bg1"/>
-          </a:solidFill>
-          <a:ln>
-            <a:solidFill>
-              <a:schemeClr val="tx1"/>
-            </a:solidFill>
-          </a:ln>
-        </p:spPr>
-        <p:style>
-          <a:lnRef idx="2">
-            <a:schemeClr val="accent1">
-              <a:shade val="50000"/>
-            </a:schemeClr>
-          </a:lnRef>
-          <a:fillRef idx="1">
-            <a:schemeClr val="accent1"/>
-          </a:fillRef>
-          <a:effectRef idx="0">
-            <a:schemeClr val="accent1"/>
-          </a:effectRef>
-          <a:fontRef idx="minor">
-            <a:schemeClr val="lt1"/>
-          </a:fontRef>
-        </p:style>
-        <p:txBody>
-          <a:bodyPr rtlCol="0" anchor="ctr"/>
-          <a:lstStyle/>
-          <a:p>
-            <a:pPr algn="ctr"/>
-            <a:r>
-              <a:rPr lang="en-US" sz="1400" dirty="0">
-                <a:solidFill>
-                  <a:schemeClr val="tx1"/>
-                </a:solidFill>
-              </a:rPr>
-              <a:t>Web</a:t>
-            </a:r>
-          </a:p>
-        </p:txBody>
-      </p:sp>
-      <p:cxnSp>
-        <p:nvCxnSpPr>
-          <p:cNvPr id="52" name="Elbow Connector 51"/>
-          <p:cNvCxnSpPr>
-            <a:stCxn id="2" idx="0"/>
-            <a:endCxn id="51" idx="2"/>
-          </p:cNvCxnSpPr>
-          <p:nvPr/>
-        </p:nvCxnSpPr>
-        <p:spPr>
-          <a:xfrm rot="5400000" flipH="1" flipV="1">
-            <a:off x="2222648" y="1760922"/>
-            <a:ext cx="476678" cy="383835"/>
-          </a:xfrm>
-          <a:prstGeom prst="bentConnector2">
-            <a:avLst/>
-          </a:prstGeom>
-          <a:ln w="28575">
-            <a:solidFill>
-              <a:srgbClr val="00B050"/>
-            </a:solidFill>
-            <a:prstDash val="sysDot"/>
-            <a:tailEnd type="arrow"/>
-          </a:ln>
-        </p:spPr>
-        <p:style>
-          <a:lnRef idx="1">
-            <a:schemeClr val="accent1"/>
-          </a:lnRef>
-          <a:fillRef idx="0">
-            <a:schemeClr val="accent1"/>
-          </a:fillRef>
-          <a:effectRef idx="0">
-            <a:schemeClr val="accent1"/>
-          </a:effectRef>
-          <a:fontRef idx="minor">
-            <a:schemeClr val="tx1"/>
-          </a:fontRef>
-        </p:style>
-      </p:cxnSp>
-      <p:sp>
-        <p:nvSpPr>
           <p:cNvPr id="23" name="Rectangle 62"/>
           <p:cNvSpPr/>
           <p:nvPr/>
@@ -4313,7 +4212,7 @@
           <a:p>
             <a:pPr algn="ctr"/>
             <a:r>
-              <a:rPr lang="en-US" sz="1600" dirty="0" smtClean="0">
+              <a:rPr lang="en-US" sz="1600" dirty="0">
                 <a:solidFill>
                   <a:schemeClr val="bg1"/>
                 </a:solidFill>
@@ -4664,7 +4563,7 @@
           <a:p>
             <a:pPr algn="ctr"/>
             <a:r>
-              <a:rPr lang="en-US" sz="1600" dirty="0" smtClean="0">
+              <a:rPr lang="en-US" sz="1600" dirty="0">
                 <a:solidFill>
                   <a:schemeClr val="bg1"/>
                 </a:solidFill>
@@ -4672,25 +4571,20 @@
               <a:t>Logs</a:t>
             </a:r>
             <a:br>
-              <a:rPr lang="en-US" sz="1600" dirty="0" smtClean="0">
+              <a:rPr lang="en-US" sz="1600" dirty="0">
                 <a:solidFill>
                   <a:schemeClr val="bg1"/>
                 </a:solidFill>
               </a:rPr>
             </a:br>
             <a:r>
-              <a:rPr lang="en-US" sz="1600" dirty="0" smtClean="0">
+              <a:rPr lang="en-US" sz="1600" dirty="0">
                 <a:solidFill>
                   <a:schemeClr val="bg1"/>
                 </a:solidFill>
               </a:rPr>
               <a:t>Center</a:t>
             </a:r>
-            <a:endParaRPr lang="en-US" sz="1600" dirty="0">
-              <a:solidFill>
-                <a:schemeClr val="bg1"/>
-              </a:solidFill>
-            </a:endParaRPr>
           </a:p>
         </p:txBody>
       </p:sp>

</xml_diff>

<commit_message>
DG finished with relevant pictures updated
</commit_message>
<xml_diff>
--- a/docs/diagrams/ArchitectureDiagram.pptx
+++ b/docs/diagrams/ArchitectureDiagram.pptx
@@ -208,7 +208,7 @@
           <a:p>
             <a:fld id="{F5CC4B3F-88C1-4FFA-B1B6-F41C21DC6924}" type="datetimeFigureOut">
               <a:rPr lang="en-US" smtClean="0"/>
-              <a:t>10/28/2018</a:t>
+              <a:t>11/12/2018</a:t>
             </a:fld>
             <a:endParaRPr lang="en-US"/>
           </a:p>
@@ -654,7 +654,7 @@
           <a:p>
             <a:fld id="{78C97017-6FC3-485B-9764-EAC9E56C1D49}" type="datetimeFigureOut">
               <a:rPr lang="en-US" smtClean="0"/>
-              <a:t>10/28/2018</a:t>
+              <a:t>11/12/2018</a:t>
             </a:fld>
             <a:endParaRPr lang="en-US"/>
           </a:p>
@@ -822,7 +822,7 @@
           <a:p>
             <a:fld id="{78C97017-6FC3-485B-9764-EAC9E56C1D49}" type="datetimeFigureOut">
               <a:rPr lang="en-US" smtClean="0"/>
-              <a:t>10/28/2018</a:t>
+              <a:t>11/12/2018</a:t>
             </a:fld>
             <a:endParaRPr lang="en-US"/>
           </a:p>
@@ -1000,7 +1000,7 @@
           <a:p>
             <a:fld id="{78C97017-6FC3-485B-9764-EAC9E56C1D49}" type="datetimeFigureOut">
               <a:rPr lang="en-US" smtClean="0"/>
-              <a:t>10/28/2018</a:t>
+              <a:t>11/12/2018</a:t>
             </a:fld>
             <a:endParaRPr lang="en-US"/>
           </a:p>
@@ -1168,7 +1168,7 @@
           <a:p>
             <a:fld id="{78C97017-6FC3-485B-9764-EAC9E56C1D49}" type="datetimeFigureOut">
               <a:rPr lang="en-US" smtClean="0"/>
-              <a:t>10/28/2018</a:t>
+              <a:t>11/12/2018</a:t>
             </a:fld>
             <a:endParaRPr lang="en-US"/>
           </a:p>
@@ -1413,7 +1413,7 @@
           <a:p>
             <a:fld id="{78C97017-6FC3-485B-9764-EAC9E56C1D49}" type="datetimeFigureOut">
               <a:rPr lang="en-US" smtClean="0"/>
-              <a:t>10/28/2018</a:t>
+              <a:t>11/12/2018</a:t>
             </a:fld>
             <a:endParaRPr lang="en-US"/>
           </a:p>
@@ -1698,7 +1698,7 @@
           <a:p>
             <a:fld id="{78C97017-6FC3-485B-9764-EAC9E56C1D49}" type="datetimeFigureOut">
               <a:rPr lang="en-US" smtClean="0"/>
-              <a:t>10/28/2018</a:t>
+              <a:t>11/12/2018</a:t>
             </a:fld>
             <a:endParaRPr lang="en-US"/>
           </a:p>
@@ -2117,7 +2117,7 @@
           <a:p>
             <a:fld id="{78C97017-6FC3-485B-9764-EAC9E56C1D49}" type="datetimeFigureOut">
               <a:rPr lang="en-US" smtClean="0"/>
-              <a:t>10/28/2018</a:t>
+              <a:t>11/12/2018</a:t>
             </a:fld>
             <a:endParaRPr lang="en-US"/>
           </a:p>
@@ -2234,7 +2234,7 @@
           <a:p>
             <a:fld id="{78C97017-6FC3-485B-9764-EAC9E56C1D49}" type="datetimeFigureOut">
               <a:rPr lang="en-US" smtClean="0"/>
-              <a:t>10/28/2018</a:t>
+              <a:t>11/12/2018</a:t>
             </a:fld>
             <a:endParaRPr lang="en-US"/>
           </a:p>
@@ -2329,7 +2329,7 @@
           <a:p>
             <a:fld id="{78C97017-6FC3-485B-9764-EAC9E56C1D49}" type="datetimeFigureOut">
               <a:rPr lang="en-US" smtClean="0"/>
-              <a:t>10/28/2018</a:t>
+              <a:t>11/12/2018</a:t>
             </a:fld>
             <a:endParaRPr lang="en-US"/>
           </a:p>
@@ -2604,7 +2604,7 @@
           <a:p>
             <a:fld id="{78C97017-6FC3-485B-9764-EAC9E56C1D49}" type="datetimeFigureOut">
               <a:rPr lang="en-US" smtClean="0"/>
-              <a:t>10/28/2018</a:t>
+              <a:t>11/12/2018</a:t>
             </a:fld>
             <a:endParaRPr lang="en-US"/>
           </a:p>
@@ -2856,7 +2856,7 @@
           <a:p>
             <a:fld id="{78C97017-6FC3-485B-9764-EAC9E56C1D49}" type="datetimeFigureOut">
               <a:rPr lang="en-US" smtClean="0"/>
-              <a:t>10/28/2018</a:t>
+              <a:t>11/12/2018</a:t>
             </a:fld>
             <a:endParaRPr lang="en-US"/>
           </a:p>
@@ -3067,7 +3067,7 @@
           <a:p>
             <a:fld id="{78C97017-6FC3-485B-9764-EAC9E56C1D49}" type="datetimeFigureOut">
               <a:rPr lang="en-US" smtClean="0"/>
-              <a:t>10/28/2018</a:t>
+              <a:t>11/12/2018</a:t>
             </a:fld>
             <a:endParaRPr lang="en-US"/>
           </a:p>
@@ -3801,44 +3801,6 @@
       </p:sp>
       <p:cxnSp>
         <p:nvCxnSpPr>
-          <p:cNvPr id="10" name="Straight Arrow Connector 9"/>
-          <p:cNvCxnSpPr>
-            <a:cxnSpLocks/>
-          </p:cNvCxnSpPr>
-          <p:nvPr/>
-        </p:nvCxnSpPr>
-        <p:spPr>
-          <a:xfrm flipV="1">
-            <a:off x="2297327" y="2428115"/>
-            <a:ext cx="1512673" cy="10684"/>
-          </a:xfrm>
-          <a:prstGeom prst="straightConnector1">
-            <a:avLst/>
-          </a:prstGeom>
-          <a:ln w="28575">
-            <a:solidFill>
-              <a:srgbClr val="00B050"/>
-            </a:solidFill>
-            <a:tailEnd type="arrow"/>
-          </a:ln>
-        </p:spPr>
-        <p:style>
-          <a:lnRef idx="1">
-            <a:schemeClr val="accent1"/>
-          </a:lnRef>
-          <a:fillRef idx="0">
-            <a:schemeClr val="accent1"/>
-          </a:fillRef>
-          <a:effectRef idx="0">
-            <a:schemeClr val="accent1"/>
-          </a:effectRef>
-          <a:fontRef idx="minor">
-            <a:schemeClr val="tx1"/>
-          </a:fontRef>
-        </p:style>
-      </p:cxnSp>
-      <p:cxnSp>
-        <p:nvCxnSpPr>
           <p:cNvPr id="12" name="Straight Arrow Connector 11"/>
           <p:cNvCxnSpPr>
             <a:cxnSpLocks/>
@@ -4783,8 +4745,8 @@
         </p:nvSpPr>
         <p:spPr>
           <a:xfrm flipH="1">
-            <a:off x="2516801" y="2593387"/>
-            <a:ext cx="973669" cy="460031"/>
+            <a:off x="2516798" y="2191179"/>
+            <a:ext cx="973669" cy="797578"/>
           </a:xfrm>
           <a:prstGeom prst="roundRect">
             <a:avLst/>
@@ -4851,8 +4813,8 @@
         </p:nvCxnSpPr>
         <p:spPr>
           <a:xfrm>
-            <a:off x="2069246" y="2823403"/>
-            <a:ext cx="447555" cy="0"/>
+            <a:off x="2131488" y="2589968"/>
+            <a:ext cx="385310" cy="0"/>
           </a:xfrm>
           <a:prstGeom prst="straightConnector1">
             <a:avLst/>
@@ -4895,7 +4857,7 @@
         </p:nvCxnSpPr>
         <p:spPr>
           <a:xfrm>
-            <a:off x="3362532" y="2810203"/>
+            <a:off x="3362445" y="2589968"/>
             <a:ext cx="447555" cy="0"/>
           </a:xfrm>
           <a:prstGeom prst="straightConnector1">

</xml_diff>